<commit_message>
Added name to powerpoint
</commit_message>
<xml_diff>
--- a/powerpoint/Bubble Warrior Adventures.pptx
+++ b/powerpoint/Bubble Warrior Adventures.pptx
@@ -110,6 +110,11 @@
       </a:defRPr>
     </a:lvl9pPr>
   </p:defaultTextStyle>
+  <p:extLst>
+    <p:ext uri="{EFAFB233-063F-42B5-8137-9DF3F51BA10A}">
+      <p15:sldGuideLst xmlns:p15="http://schemas.microsoft.com/office/powerpoint/2012/main"/>
+    </p:ext>
+  </p:extLst>
 </p:presentation>
 </file>
 
@@ -691,7 +696,7 @@
           </a:lstStyle>
           <a:p>
             <a:r>
-              <a:rPr lang="en-US" smtClean="0"/>
+              <a:rPr lang="en-US"/>
               <a:t>Click to edit Master title style</a:t>
             </a:r>
             <a:endParaRPr lang="en-US" dirty="0"/>
@@ -811,7 +816,7 @@
           </a:lstStyle>
           <a:p>
             <a:r>
-              <a:rPr lang="en-US" smtClean="0"/>
+              <a:rPr lang="en-US"/>
               <a:t>Click to edit Master subtitle style</a:t>
             </a:r>
             <a:endParaRPr lang="en-US" dirty="0"/>
@@ -835,7 +840,7 @@
           <a:p>
             <a:fld id="{8F07F569-3A41-400A-AFFF-DAD58A2A63FB}" type="datetimeFigureOut">
               <a:rPr lang="en-US" smtClean="0"/>
-              <a:t>1/30/2017</a:t>
+              <a:t>1/31/2017</a:t>
             </a:fld>
             <a:endParaRPr lang="en-US"/>
           </a:p>
@@ -940,7 +945,7 @@
           </a:lstStyle>
           <a:p>
             <a:r>
-              <a:rPr lang="en-US" smtClean="0"/>
+              <a:rPr lang="en-US"/>
               <a:t>Click to edit Master title style</a:t>
             </a:r>
             <a:endParaRPr lang="en-US" dirty="0"/>
@@ -1063,7 +1068,7 @@
           <a:p>
             <a:pPr lvl="0"/>
             <a:r>
-              <a:rPr lang="en-US" smtClean="0"/>
+              <a:rPr lang="en-US"/>
               <a:t>Click to edit Master text styles</a:t>
             </a:r>
           </a:p>
@@ -1086,7 +1091,7 @@
           <a:p>
             <a:fld id="{8F07F569-3A41-400A-AFFF-DAD58A2A63FB}" type="datetimeFigureOut">
               <a:rPr lang="en-US" smtClean="0"/>
-              <a:t>1/30/2017</a:t>
+              <a:t>1/31/2017</a:t>
             </a:fld>
             <a:endParaRPr lang="en-US"/>
           </a:p>
@@ -1191,7 +1196,7 @@
           </a:lstStyle>
           <a:p>
             <a:r>
-              <a:rPr lang="en-US" smtClean="0"/>
+              <a:rPr lang="en-US"/>
               <a:t>Click to edit Master title style</a:t>
             </a:r>
             <a:endParaRPr lang="en-US" dirty="0"/>
@@ -1255,7 +1260,7 @@
           <a:p>
             <a:pPr lvl="0"/>
             <a:r>
-              <a:rPr lang="en-US" smtClean="0"/>
+              <a:rPr lang="en-US"/>
               <a:t>Click to edit Master text styles</a:t>
             </a:r>
           </a:p>
@@ -1377,7 +1382,7 @@
           <a:p>
             <a:pPr lvl="0"/>
             <a:r>
-              <a:rPr lang="en-US" smtClean="0"/>
+              <a:rPr lang="en-US"/>
               <a:t>Click to edit Master text styles</a:t>
             </a:r>
           </a:p>
@@ -1400,7 +1405,7 @@
           <a:p>
             <a:fld id="{8F07F569-3A41-400A-AFFF-DAD58A2A63FB}" type="datetimeFigureOut">
               <a:rPr lang="en-US" smtClean="0"/>
-              <a:t>1/30/2017</a:t>
+              <a:t>1/31/2017</a:t>
             </a:fld>
             <a:endParaRPr lang="en-US"/>
           </a:p>
@@ -1595,7 +1600,7 @@
           </a:lstStyle>
           <a:p>
             <a:r>
-              <a:rPr lang="en-US" smtClean="0"/>
+              <a:rPr lang="en-US"/>
               <a:t>Click to edit Master title style</a:t>
             </a:r>
             <a:endParaRPr lang="en-US" dirty="0"/>
@@ -1718,7 +1723,7 @@
           <a:p>
             <a:pPr lvl="0"/>
             <a:r>
-              <a:rPr lang="en-US" smtClean="0"/>
+              <a:rPr lang="en-US"/>
               <a:t>Click to edit Master text styles</a:t>
             </a:r>
           </a:p>
@@ -1741,7 +1746,7 @@
           <a:p>
             <a:fld id="{8F07F569-3A41-400A-AFFF-DAD58A2A63FB}" type="datetimeFigureOut">
               <a:rPr lang="en-US" smtClean="0"/>
-              <a:t>1/30/2017</a:t>
+              <a:t>1/31/2017</a:t>
             </a:fld>
             <a:endParaRPr lang="en-US"/>
           </a:p>
@@ -1846,7 +1851,7 @@
           </a:lstStyle>
           <a:p>
             <a:r>
-              <a:rPr lang="en-US" smtClean="0"/>
+              <a:rPr lang="en-US"/>
               <a:t>Click to edit Master title style</a:t>
             </a:r>
             <a:endParaRPr lang="en-US" dirty="0"/>
@@ -1910,7 +1915,7 @@
           <a:p>
             <a:pPr lvl="0"/>
             <a:r>
-              <a:rPr lang="en-US" smtClean="0"/>
+              <a:rPr lang="en-US"/>
               <a:t>Click to edit Master text styles</a:t>
             </a:r>
           </a:p>
@@ -2032,7 +2037,7 @@
           <a:p>
             <a:pPr lvl="0"/>
             <a:r>
-              <a:rPr lang="en-US" smtClean="0"/>
+              <a:rPr lang="en-US"/>
               <a:t>Click to edit Master text styles</a:t>
             </a:r>
           </a:p>
@@ -2055,7 +2060,7 @@
           <a:p>
             <a:fld id="{8F07F569-3A41-400A-AFFF-DAD58A2A63FB}" type="datetimeFigureOut">
               <a:rPr lang="en-US" smtClean="0"/>
-              <a:t>1/30/2017</a:t>
+              <a:t>1/31/2017</a:t>
             </a:fld>
             <a:endParaRPr lang="en-US"/>
           </a:p>
@@ -2242,7 +2247,7 @@
           </a:lstStyle>
           <a:p>
             <a:r>
-              <a:rPr lang="en-US" smtClean="0"/>
+              <a:rPr lang="en-US"/>
               <a:t>Click to edit Master title style</a:t>
             </a:r>
             <a:endParaRPr lang="en-US" dirty="0"/>
@@ -2303,7 +2308,7 @@
           <a:p>
             <a:pPr lvl="0"/>
             <a:r>
-              <a:rPr lang="en-US" smtClean="0"/>
+              <a:rPr lang="en-US"/>
               <a:t>Click to edit Master text styles</a:t>
             </a:r>
           </a:p>
@@ -2425,7 +2430,7 @@
           <a:p>
             <a:pPr lvl="0"/>
             <a:r>
-              <a:rPr lang="en-US" smtClean="0"/>
+              <a:rPr lang="en-US"/>
               <a:t>Click to edit Master text styles</a:t>
             </a:r>
           </a:p>
@@ -2448,7 +2453,7 @@
           <a:p>
             <a:fld id="{8F07F569-3A41-400A-AFFF-DAD58A2A63FB}" type="datetimeFigureOut">
               <a:rPr lang="en-US" smtClean="0"/>
-              <a:t>1/30/2017</a:t>
+              <a:t>1/31/2017</a:t>
             </a:fld>
             <a:endParaRPr lang="en-US"/>
           </a:p>
@@ -2542,7 +2547,7 @@
           <a:lstStyle/>
           <a:p>
             <a:r>
-              <a:rPr lang="en-US" smtClean="0"/>
+              <a:rPr lang="en-US"/>
               <a:t>Click to edit Master title style</a:t>
             </a:r>
             <a:endParaRPr lang="en-US" dirty="0"/>
@@ -2566,35 +2571,35 @@
           <a:p>
             <a:pPr lvl="0"/>
             <a:r>
-              <a:rPr lang="en-US" smtClean="0"/>
+              <a:rPr lang="en-US"/>
               <a:t>Click to edit Master text styles</a:t>
             </a:r>
           </a:p>
           <a:p>
             <a:pPr lvl="1"/>
             <a:r>
-              <a:rPr lang="en-US" smtClean="0"/>
+              <a:rPr lang="en-US"/>
               <a:t>Second level</a:t>
             </a:r>
           </a:p>
           <a:p>
             <a:pPr lvl="2"/>
             <a:r>
-              <a:rPr lang="en-US" smtClean="0"/>
+              <a:rPr lang="en-US"/>
               <a:t>Third level</a:t>
             </a:r>
           </a:p>
           <a:p>
             <a:pPr lvl="3"/>
             <a:r>
-              <a:rPr lang="en-US" smtClean="0"/>
+              <a:rPr lang="en-US"/>
               <a:t>Fourth level</a:t>
             </a:r>
           </a:p>
           <a:p>
             <a:pPr lvl="4"/>
             <a:r>
-              <a:rPr lang="en-US" smtClean="0"/>
+              <a:rPr lang="en-US"/>
               <a:t>Fifth level</a:t>
             </a:r>
             <a:endParaRPr lang="en-US" dirty="0"/>
@@ -2618,7 +2623,7 @@
           <a:p>
             <a:fld id="{8F07F569-3A41-400A-AFFF-DAD58A2A63FB}" type="datetimeFigureOut">
               <a:rPr lang="en-US" smtClean="0"/>
-              <a:t>1/30/2017</a:t>
+              <a:t>1/31/2017</a:t>
             </a:fld>
             <a:endParaRPr lang="en-US"/>
           </a:p>
@@ -2717,7 +2722,7 @@
           <a:lstStyle/>
           <a:p>
             <a:r>
-              <a:rPr lang="en-US" smtClean="0"/>
+              <a:rPr lang="en-US"/>
               <a:t>Click to edit Master title style</a:t>
             </a:r>
             <a:endParaRPr lang="en-US" dirty="0"/>
@@ -2746,35 +2751,35 @@
           <a:p>
             <a:pPr lvl="0"/>
             <a:r>
-              <a:rPr lang="en-US" smtClean="0"/>
+              <a:rPr lang="en-US"/>
               <a:t>Click to edit Master text styles</a:t>
             </a:r>
           </a:p>
           <a:p>
             <a:pPr lvl="1"/>
             <a:r>
-              <a:rPr lang="en-US" smtClean="0"/>
+              <a:rPr lang="en-US"/>
               <a:t>Second level</a:t>
             </a:r>
           </a:p>
           <a:p>
             <a:pPr lvl="2"/>
             <a:r>
-              <a:rPr lang="en-US" smtClean="0"/>
+              <a:rPr lang="en-US"/>
               <a:t>Third level</a:t>
             </a:r>
           </a:p>
           <a:p>
             <a:pPr lvl="3"/>
             <a:r>
-              <a:rPr lang="en-US" smtClean="0"/>
+              <a:rPr lang="en-US"/>
               <a:t>Fourth level</a:t>
             </a:r>
           </a:p>
           <a:p>
             <a:pPr lvl="4"/>
             <a:r>
-              <a:rPr lang="en-US" smtClean="0"/>
+              <a:rPr lang="en-US"/>
               <a:t>Fifth level</a:t>
             </a:r>
             <a:endParaRPr lang="en-US" dirty="0"/>
@@ -2798,7 +2803,7 @@
           <a:p>
             <a:fld id="{8F07F569-3A41-400A-AFFF-DAD58A2A63FB}" type="datetimeFigureOut">
               <a:rPr lang="en-US" smtClean="0"/>
-              <a:t>1/30/2017</a:t>
+              <a:t>1/31/2017</a:t>
             </a:fld>
             <a:endParaRPr lang="en-US"/>
           </a:p>
@@ -2898,7 +2903,7 @@
           </a:lstStyle>
           <a:p>
             <a:r>
-              <a:rPr lang="en-US" smtClean="0"/>
+              <a:rPr lang="en-US"/>
               <a:t>Click to edit Master title style</a:t>
             </a:r>
             <a:endParaRPr lang="en-US" dirty="0"/>
@@ -2922,35 +2927,35 @@
           <a:p>
             <a:pPr lvl="0"/>
             <a:r>
-              <a:rPr lang="en-US" smtClean="0"/>
+              <a:rPr lang="en-US"/>
               <a:t>Click to edit Master text styles</a:t>
             </a:r>
           </a:p>
           <a:p>
             <a:pPr lvl="1"/>
             <a:r>
-              <a:rPr lang="en-US" smtClean="0"/>
+              <a:rPr lang="en-US"/>
               <a:t>Second level</a:t>
             </a:r>
           </a:p>
           <a:p>
             <a:pPr lvl="2"/>
             <a:r>
-              <a:rPr lang="en-US" smtClean="0"/>
+              <a:rPr lang="en-US"/>
               <a:t>Third level</a:t>
             </a:r>
           </a:p>
           <a:p>
             <a:pPr lvl="3"/>
             <a:r>
-              <a:rPr lang="en-US" smtClean="0"/>
+              <a:rPr lang="en-US"/>
               <a:t>Fourth level</a:t>
             </a:r>
           </a:p>
           <a:p>
             <a:pPr lvl="4"/>
             <a:r>
-              <a:rPr lang="en-US" smtClean="0"/>
+              <a:rPr lang="en-US"/>
               <a:t>Fifth level</a:t>
             </a:r>
             <a:endParaRPr lang="en-US" dirty="0"/>
@@ -2974,7 +2979,7 @@
           <a:p>
             <a:fld id="{8F07F569-3A41-400A-AFFF-DAD58A2A63FB}" type="datetimeFigureOut">
               <a:rPr lang="en-US" smtClean="0"/>
-              <a:t>1/30/2017</a:t>
+              <a:t>1/31/2017</a:t>
             </a:fld>
             <a:endParaRPr lang="en-US"/>
           </a:p>
@@ -3077,7 +3082,7 @@
           </a:lstStyle>
           <a:p>
             <a:r>
-              <a:rPr lang="en-US" smtClean="0"/>
+              <a:rPr lang="en-US"/>
               <a:t>Click to edit Master title style</a:t>
             </a:r>
             <a:endParaRPr lang="en-US" dirty="0"/>
@@ -3198,7 +3203,7 @@
           <a:p>
             <a:pPr lvl="0"/>
             <a:r>
-              <a:rPr lang="en-US" smtClean="0"/>
+              <a:rPr lang="en-US"/>
               <a:t>Click to edit Master text styles</a:t>
             </a:r>
           </a:p>
@@ -3221,7 +3226,7 @@
           <a:p>
             <a:fld id="{8F07F569-3A41-400A-AFFF-DAD58A2A63FB}" type="datetimeFigureOut">
               <a:rPr lang="en-US" smtClean="0"/>
-              <a:t>1/30/2017</a:t>
+              <a:t>1/31/2017</a:t>
             </a:fld>
             <a:endParaRPr lang="en-US"/>
           </a:p>
@@ -3315,7 +3320,7 @@
           <a:lstStyle/>
           <a:p>
             <a:r>
-              <a:rPr lang="en-US" smtClean="0"/>
+              <a:rPr lang="en-US"/>
               <a:t>Click to edit Master title style</a:t>
             </a:r>
             <a:endParaRPr lang="en-US" dirty="0"/>
@@ -3344,35 +3349,35 @@
           <a:p>
             <a:pPr lvl="0"/>
             <a:r>
-              <a:rPr lang="en-US" smtClean="0"/>
+              <a:rPr lang="en-US"/>
               <a:t>Click to edit Master text styles</a:t>
             </a:r>
           </a:p>
           <a:p>
             <a:pPr lvl="1"/>
             <a:r>
-              <a:rPr lang="en-US" smtClean="0"/>
+              <a:rPr lang="en-US"/>
               <a:t>Second level</a:t>
             </a:r>
           </a:p>
           <a:p>
             <a:pPr lvl="2"/>
             <a:r>
-              <a:rPr lang="en-US" smtClean="0"/>
+              <a:rPr lang="en-US"/>
               <a:t>Third level</a:t>
             </a:r>
           </a:p>
           <a:p>
             <a:pPr lvl="3"/>
             <a:r>
-              <a:rPr lang="en-US" smtClean="0"/>
+              <a:rPr lang="en-US"/>
               <a:t>Fourth level</a:t>
             </a:r>
           </a:p>
           <a:p>
             <a:pPr lvl="4"/>
             <a:r>
-              <a:rPr lang="en-US" smtClean="0"/>
+              <a:rPr lang="en-US"/>
               <a:t>Fifth level</a:t>
             </a:r>
             <a:endParaRPr lang="en-US" dirty="0"/>
@@ -3401,35 +3406,35 @@
           <a:p>
             <a:pPr lvl="0"/>
             <a:r>
-              <a:rPr lang="en-US" smtClean="0"/>
+              <a:rPr lang="en-US"/>
               <a:t>Click to edit Master text styles</a:t>
             </a:r>
           </a:p>
           <a:p>
             <a:pPr lvl="1"/>
             <a:r>
-              <a:rPr lang="en-US" smtClean="0"/>
+              <a:rPr lang="en-US"/>
               <a:t>Second level</a:t>
             </a:r>
           </a:p>
           <a:p>
             <a:pPr lvl="2"/>
             <a:r>
-              <a:rPr lang="en-US" smtClean="0"/>
+              <a:rPr lang="en-US"/>
               <a:t>Third level</a:t>
             </a:r>
           </a:p>
           <a:p>
             <a:pPr lvl="3"/>
             <a:r>
-              <a:rPr lang="en-US" smtClean="0"/>
+              <a:rPr lang="en-US"/>
               <a:t>Fourth level</a:t>
             </a:r>
           </a:p>
           <a:p>
             <a:pPr lvl="4"/>
             <a:r>
-              <a:rPr lang="en-US" smtClean="0"/>
+              <a:rPr lang="en-US"/>
               <a:t>Fifth level</a:t>
             </a:r>
             <a:endParaRPr lang="en-US" dirty="0"/>
@@ -3453,7 +3458,7 @@
           <a:p>
             <a:fld id="{8F07F569-3A41-400A-AFFF-DAD58A2A63FB}" type="datetimeFigureOut">
               <a:rPr lang="en-US" smtClean="0"/>
-              <a:t>1/30/2017</a:t>
+              <a:t>1/31/2017</a:t>
             </a:fld>
             <a:endParaRPr lang="en-US"/>
           </a:p>
@@ -3551,7 +3556,7 @@
           </a:lstStyle>
           <a:p>
             <a:r>
-              <a:rPr lang="en-US" smtClean="0"/>
+              <a:rPr lang="en-US"/>
               <a:t>Click to edit Master title style</a:t>
             </a:r>
             <a:endParaRPr lang="en-US" dirty="0"/>
@@ -3619,7 +3624,7 @@
           <a:p>
             <a:pPr lvl="0"/>
             <a:r>
-              <a:rPr lang="en-US" smtClean="0"/>
+              <a:rPr lang="en-US"/>
               <a:t>Click to edit Master text styles</a:t>
             </a:r>
           </a:p>
@@ -3649,35 +3654,35 @@
           <a:p>
             <a:pPr lvl="0"/>
             <a:r>
-              <a:rPr lang="en-US" smtClean="0"/>
+              <a:rPr lang="en-US"/>
               <a:t>Click to edit Master text styles</a:t>
             </a:r>
           </a:p>
           <a:p>
             <a:pPr lvl="1"/>
             <a:r>
-              <a:rPr lang="en-US" smtClean="0"/>
+              <a:rPr lang="en-US"/>
               <a:t>Second level</a:t>
             </a:r>
           </a:p>
           <a:p>
             <a:pPr lvl="2"/>
             <a:r>
-              <a:rPr lang="en-US" smtClean="0"/>
+              <a:rPr lang="en-US"/>
               <a:t>Third level</a:t>
             </a:r>
           </a:p>
           <a:p>
             <a:pPr lvl="3"/>
             <a:r>
-              <a:rPr lang="en-US" smtClean="0"/>
+              <a:rPr lang="en-US"/>
               <a:t>Fourth level</a:t>
             </a:r>
           </a:p>
           <a:p>
             <a:pPr lvl="4"/>
             <a:r>
-              <a:rPr lang="en-US" smtClean="0"/>
+              <a:rPr lang="en-US"/>
               <a:t>Fifth level</a:t>
             </a:r>
             <a:endParaRPr lang="en-US" dirty="0"/>
@@ -3745,7 +3750,7 @@
           <a:p>
             <a:pPr lvl="0"/>
             <a:r>
-              <a:rPr lang="en-US" smtClean="0"/>
+              <a:rPr lang="en-US"/>
               <a:t>Click to edit Master text styles</a:t>
             </a:r>
           </a:p>
@@ -3775,35 +3780,35 @@
           <a:p>
             <a:pPr lvl="0"/>
             <a:r>
-              <a:rPr lang="en-US" smtClean="0"/>
+              <a:rPr lang="en-US"/>
               <a:t>Click to edit Master text styles</a:t>
             </a:r>
           </a:p>
           <a:p>
             <a:pPr lvl="1"/>
             <a:r>
-              <a:rPr lang="en-US" smtClean="0"/>
+              <a:rPr lang="en-US"/>
               <a:t>Second level</a:t>
             </a:r>
           </a:p>
           <a:p>
             <a:pPr lvl="2"/>
             <a:r>
-              <a:rPr lang="en-US" smtClean="0"/>
+              <a:rPr lang="en-US"/>
               <a:t>Third level</a:t>
             </a:r>
           </a:p>
           <a:p>
             <a:pPr lvl="3"/>
             <a:r>
-              <a:rPr lang="en-US" smtClean="0"/>
+              <a:rPr lang="en-US"/>
               <a:t>Fourth level</a:t>
             </a:r>
           </a:p>
           <a:p>
             <a:pPr lvl="4"/>
             <a:r>
-              <a:rPr lang="en-US" smtClean="0"/>
+              <a:rPr lang="en-US"/>
               <a:t>Fifth level</a:t>
             </a:r>
             <a:endParaRPr lang="en-US" dirty="0"/>
@@ -3827,7 +3832,7 @@
           <a:p>
             <a:fld id="{8F07F569-3A41-400A-AFFF-DAD58A2A63FB}" type="datetimeFigureOut">
               <a:rPr lang="en-US" smtClean="0"/>
-              <a:t>1/30/2017</a:t>
+              <a:t>1/31/2017</a:t>
             </a:fld>
             <a:endParaRPr lang="en-US"/>
           </a:p>
@@ -3926,7 +3931,7 @@
           <a:lstStyle/>
           <a:p>
             <a:r>
-              <a:rPr lang="en-US" smtClean="0"/>
+              <a:rPr lang="en-US"/>
               <a:t>Click to edit Master title style</a:t>
             </a:r>
             <a:endParaRPr lang="en-US" dirty="0"/>
@@ -3950,7 +3955,7 @@
           <a:p>
             <a:fld id="{8F07F569-3A41-400A-AFFF-DAD58A2A63FB}" type="datetimeFigureOut">
               <a:rPr lang="en-US" smtClean="0"/>
-              <a:t>1/30/2017</a:t>
+              <a:t>1/31/2017</a:t>
             </a:fld>
             <a:endParaRPr lang="en-US"/>
           </a:p>
@@ -4045,7 +4050,7 @@
           <a:p>
             <a:fld id="{8F07F569-3A41-400A-AFFF-DAD58A2A63FB}" type="datetimeFigureOut">
               <a:rPr lang="en-US" smtClean="0"/>
-              <a:t>1/30/2017</a:t>
+              <a:t>1/31/2017</a:t>
             </a:fld>
             <a:endParaRPr lang="en-US"/>
           </a:p>
@@ -4150,7 +4155,7 @@
           </a:lstStyle>
           <a:p>
             <a:r>
-              <a:rPr lang="en-US" smtClean="0"/>
+              <a:rPr lang="en-US"/>
               <a:t>Click to edit Master title style</a:t>
             </a:r>
             <a:endParaRPr lang="en-US" dirty="0"/>
@@ -4181,35 +4186,35 @@
           <a:p>
             <a:pPr lvl="0"/>
             <a:r>
-              <a:rPr lang="en-US" smtClean="0"/>
+              <a:rPr lang="en-US"/>
               <a:t>Click to edit Master text styles</a:t>
             </a:r>
           </a:p>
           <a:p>
             <a:pPr lvl="1"/>
             <a:r>
-              <a:rPr lang="en-US" smtClean="0"/>
+              <a:rPr lang="en-US"/>
               <a:t>Second level</a:t>
             </a:r>
           </a:p>
           <a:p>
             <a:pPr lvl="2"/>
             <a:r>
-              <a:rPr lang="en-US" smtClean="0"/>
+              <a:rPr lang="en-US"/>
               <a:t>Third level</a:t>
             </a:r>
           </a:p>
           <a:p>
             <a:pPr lvl="3"/>
             <a:r>
-              <a:rPr lang="en-US" smtClean="0"/>
+              <a:rPr lang="en-US"/>
               <a:t>Fourth level</a:t>
             </a:r>
           </a:p>
           <a:p>
             <a:pPr lvl="4"/>
             <a:r>
-              <a:rPr lang="en-US" smtClean="0"/>
+              <a:rPr lang="en-US"/>
               <a:t>Fifth level</a:t>
             </a:r>
             <a:endParaRPr lang="en-US" dirty="0"/>
@@ -4277,7 +4282,7 @@
           <a:p>
             <a:pPr lvl="0"/>
             <a:r>
-              <a:rPr lang="en-US" smtClean="0"/>
+              <a:rPr lang="en-US"/>
               <a:t>Click to edit Master text styles</a:t>
             </a:r>
           </a:p>
@@ -4300,7 +4305,7 @@
           <a:p>
             <a:fld id="{8F07F569-3A41-400A-AFFF-DAD58A2A63FB}" type="datetimeFigureOut">
               <a:rPr lang="en-US" smtClean="0"/>
-              <a:t>1/30/2017</a:t>
+              <a:t>1/31/2017</a:t>
             </a:fld>
             <a:endParaRPr lang="en-US"/>
           </a:p>
@@ -4405,7 +4410,7 @@
           </a:lstStyle>
           <a:p>
             <a:r>
-              <a:rPr lang="en-US" smtClean="0"/>
+              <a:rPr lang="en-US"/>
               <a:t>Click to edit Master title style</a:t>
             </a:r>
             <a:endParaRPr lang="en-US" dirty="0"/>
@@ -4472,7 +4477,7 @@
           </a:lstStyle>
           <a:p>
             <a:r>
-              <a:rPr lang="en-US" smtClean="0"/>
+              <a:rPr lang="en-US"/>
               <a:t>Click icon to add picture</a:t>
             </a:r>
             <a:endParaRPr lang="en-US" dirty="0"/>
@@ -4540,7 +4545,7 @@
           <a:p>
             <a:pPr lvl="0"/>
             <a:r>
-              <a:rPr lang="en-US" smtClean="0"/>
+              <a:rPr lang="en-US"/>
               <a:t>Click to edit Master text styles</a:t>
             </a:r>
           </a:p>
@@ -4563,7 +4568,7 @@
           <a:p>
             <a:fld id="{8F07F569-3A41-400A-AFFF-DAD58A2A63FB}" type="datetimeFigureOut">
               <a:rPr lang="en-US" smtClean="0"/>
-              <a:t>1/30/2017</a:t>
+              <a:t>1/31/2017</a:t>
             </a:fld>
             <a:endParaRPr lang="en-US"/>
           </a:p>
@@ -5202,7 +5207,7 @@
           <a:lstStyle/>
           <a:p>
             <a:r>
-              <a:rPr lang="en-US" smtClean="0"/>
+              <a:rPr lang="en-US"/>
               <a:t>Click to edit Master title style</a:t>
             </a:r>
             <a:endParaRPr lang="en-US" dirty="0"/>
@@ -5236,35 +5241,35 @@
           <a:p>
             <a:pPr lvl="0"/>
             <a:r>
-              <a:rPr lang="en-US" smtClean="0"/>
+              <a:rPr lang="en-US"/>
               <a:t>Click to edit Master text styles</a:t>
             </a:r>
           </a:p>
           <a:p>
             <a:pPr lvl="1"/>
             <a:r>
-              <a:rPr lang="en-US" smtClean="0"/>
+              <a:rPr lang="en-US"/>
               <a:t>Second level</a:t>
             </a:r>
           </a:p>
           <a:p>
             <a:pPr lvl="2"/>
             <a:r>
-              <a:rPr lang="en-US" smtClean="0"/>
+              <a:rPr lang="en-US"/>
               <a:t>Third level</a:t>
             </a:r>
           </a:p>
           <a:p>
             <a:pPr lvl="3"/>
             <a:r>
-              <a:rPr lang="en-US" smtClean="0"/>
+              <a:rPr lang="en-US"/>
               <a:t>Fourth level</a:t>
             </a:r>
           </a:p>
           <a:p>
             <a:pPr lvl="4"/>
             <a:r>
-              <a:rPr lang="en-US" smtClean="0"/>
+              <a:rPr lang="en-US"/>
               <a:t>Fifth level</a:t>
             </a:r>
             <a:endParaRPr lang="en-US" dirty="0"/>
@@ -5306,7 +5311,7 @@
           <a:p>
             <a:fld id="{8F07F569-3A41-400A-AFFF-DAD58A2A63FB}" type="datetimeFigureOut">
               <a:rPr lang="en-US" smtClean="0"/>
-              <a:t>1/30/2017</a:t>
+              <a:t>1/31/2017</a:t>
             </a:fld>
             <a:endParaRPr lang="en-US"/>
           </a:p>
@@ -5846,10 +5851,9 @@
           <a:lstStyle/>
           <a:p>
             <a:r>
-              <a:rPr lang="en-US" dirty="0" smtClean="0"/>
+              <a:rPr lang="en-US" dirty="0"/>
               <a:t>Bubble Warrior Adventures</a:t>
             </a:r>
-            <a:endParaRPr lang="en-US" dirty="0"/>
           </a:p>
         </p:txBody>
       </p:sp>
@@ -5870,20 +5874,37 @@
           </a:xfrm>
         </p:spPr>
         <p:txBody>
-          <a:bodyPr/>
-          <a:lstStyle/>
-          <a:p>
-            <a:r>
-              <a:rPr lang="en-US" dirty="0" smtClean="0"/>
+          <a:bodyPr>
+            <a:normAutofit lnSpcReduction="10000"/>
+          </a:bodyPr>
+          <a:lstStyle/>
+          <a:p>
+            <a:r>
+              <a:rPr lang="en-US" dirty="0"/>
               <a:t>Kyle Jolicoeur (Kyle_Jolicoeur@student.uml.edu)</a:t>
             </a:r>
           </a:p>
           <a:p>
             <a:r>
-              <a:rPr lang="en-US" dirty="0" smtClean="0"/>
-              <a:t>Hansel De La Cruz (Hansel_DeLaCruz@student.uml.edu)</a:t>
-            </a:r>
-            <a:endParaRPr lang="en-US" dirty="0"/>
+              <a:rPr lang="en-US" dirty="0"/>
+              <a:t>Hansel De La Cruz (</a:t>
+            </a:r>
+            <a:r>
+              <a:rPr lang="en-US" dirty="0">
+                <a:hlinkClick r:id="rId2"/>
+              </a:rPr>
+              <a:t>Hansel_DeLaCruz@student.uml.edu</a:t>
+            </a:r>
+            <a:r>
+              <a:rPr lang="en-US" dirty="0"/>
+              <a:t>)</a:t>
+            </a:r>
+          </a:p>
+          <a:p>
+            <a:r>
+              <a:rPr lang="en-US" dirty="0"/>
+              <a:t>Jennifer Green (Jennifer_Green@student.uml.edu)</a:t>
+            </a:r>
           </a:p>
         </p:txBody>
       </p:sp>
@@ -5933,10 +5954,9 @@
           <a:lstStyle/>
           <a:p>
             <a:r>
-              <a:rPr lang="en-US" dirty="0" smtClean="0"/>
+              <a:rPr lang="en-US" dirty="0"/>
               <a:t>Introduction</a:t>
             </a:r>
-            <a:endParaRPr lang="en-US" dirty="0"/>
           </a:p>
         </p:txBody>
       </p:sp>
@@ -5956,25 +5976,25 @@
           <a:lstStyle/>
           <a:p>
             <a:r>
-              <a:rPr lang="en-US" dirty="0" smtClean="0"/>
+              <a:rPr lang="en-US" dirty="0"/>
               <a:t>Our goal is to create an RPG styled game with basic AI scripts for entertainment purposes.</a:t>
             </a:r>
           </a:p>
           <a:p>
             <a:r>
-              <a:rPr lang="en-US" dirty="0" smtClean="0"/>
+              <a:rPr lang="en-US" dirty="0"/>
               <a:t>Top-down 2D graphics.</a:t>
             </a:r>
           </a:p>
           <a:p>
             <a:r>
-              <a:rPr lang="en-US" dirty="0" smtClean="0"/>
+              <a:rPr lang="en-US" dirty="0"/>
               <a:t>Desktop application.</a:t>
             </a:r>
           </a:p>
           <a:p>
             <a:r>
-              <a:rPr lang="en-US" dirty="0" smtClean="0"/>
+              <a:rPr lang="en-US" dirty="0"/>
               <a:t>Will be compiled for both Linux and Windows (separately).</a:t>
             </a:r>
           </a:p>
@@ -6026,10 +6046,9 @@
           <a:lstStyle/>
           <a:p>
             <a:r>
-              <a:rPr lang="en-US" dirty="0" smtClean="0"/>
+              <a:rPr lang="en-US" dirty="0"/>
               <a:t>Motivation</a:t>
             </a:r>
-            <a:endParaRPr lang="en-US" dirty="0"/>
           </a:p>
         </p:txBody>
       </p:sp>
@@ -6049,22 +6068,21 @@
           <a:lstStyle/>
           <a:p>
             <a:r>
-              <a:rPr lang="en-US" dirty="0" smtClean="0"/>
+              <a:rPr lang="en-US" dirty="0"/>
               <a:t>We both have an interest with video games, and are curious to see what goes into creating a game from scratch.</a:t>
             </a:r>
           </a:p>
           <a:p>
             <a:r>
-              <a:rPr lang="en-US" dirty="0" smtClean="0"/>
+              <a:rPr lang="en-US" dirty="0"/>
               <a:t>It also requires us to learn to program efficiently so we do not use an excess of computer resources in order to run the game.</a:t>
             </a:r>
           </a:p>
           <a:p>
             <a:r>
-              <a:rPr lang="en-US" dirty="0" smtClean="0"/>
+              <a:rPr lang="en-US" dirty="0"/>
               <a:t>A fun project to show friends and family.</a:t>
             </a:r>
-            <a:endParaRPr lang="en-US" dirty="0"/>
           </a:p>
         </p:txBody>
       </p:sp>
@@ -6114,10 +6132,9 @@
           <a:lstStyle/>
           <a:p>
             <a:r>
-              <a:rPr lang="en-US" dirty="0" smtClean="0"/>
+              <a:rPr lang="en-US" dirty="0"/>
               <a:t>Related Works</a:t>
             </a:r>
-            <a:endParaRPr lang="en-US" dirty="0"/>
           </a:p>
         </p:txBody>
       </p:sp>
@@ -6137,23 +6154,23 @@
           <a:lstStyle/>
           <a:p>
             <a:r>
-              <a:rPr lang="en-US" dirty="0" smtClean="0"/>
+              <a:rPr lang="en-US" dirty="0"/>
               <a:t>There are plenty of examples that can be used as a style reference.</a:t>
             </a:r>
           </a:p>
           <a:p>
             <a:r>
-              <a:rPr lang="en-US" dirty="0" smtClean="0"/>
+              <a:rPr lang="en-US" dirty="0"/>
               <a:t>Early 1990’s styled video games.</a:t>
             </a:r>
           </a:p>
           <a:p>
             <a:r>
-              <a:rPr lang="en-US" dirty="0" err="1" smtClean="0"/>
+              <a:rPr lang="en-US" dirty="0" err="1"/>
               <a:t>Pokemon</a:t>
             </a:r>
             <a:r>
-              <a:rPr lang="en-US" dirty="0" smtClean="0"/>
+              <a:rPr lang="en-US" dirty="0"/>
               <a:t>, The Legend of Zelda, Etc.</a:t>
             </a:r>
           </a:p>
@@ -6208,10 +6225,9 @@
           <a:lstStyle/>
           <a:p>
             <a:r>
-              <a:rPr lang="en-US" dirty="0" smtClean="0"/>
+              <a:rPr lang="en-US" dirty="0"/>
               <a:t>Proposed Approach</a:t>
             </a:r>
-            <a:endParaRPr lang="en-US" dirty="0"/>
           </a:p>
         </p:txBody>
       </p:sp>
@@ -6231,47 +6247,47 @@
           <a:lstStyle/>
           <a:p>
             <a:r>
-              <a:rPr lang="en-US" dirty="0" smtClean="0"/>
+              <a:rPr lang="en-US" dirty="0"/>
               <a:t>C++ based program using the SFML libraries.</a:t>
             </a:r>
           </a:p>
           <a:p>
             <a:r>
-              <a:rPr lang="en-US" dirty="0" err="1" smtClean="0"/>
+              <a:rPr lang="en-US" dirty="0" err="1"/>
               <a:t>Lua</a:t>
             </a:r>
             <a:r>
-              <a:rPr lang="en-US" dirty="0" smtClean="0"/>
+              <a:rPr lang="en-US" dirty="0"/>
               <a:t> for storing configurations, AI scripts, and data.</a:t>
             </a:r>
           </a:p>
           <a:p>
             <a:r>
-              <a:rPr lang="en-US" dirty="0" err="1" smtClean="0"/>
+              <a:rPr lang="en-US" dirty="0" err="1"/>
               <a:t>Github</a:t>
             </a:r>
             <a:r>
-              <a:rPr lang="en-US" dirty="0" smtClean="0"/>
+              <a:rPr lang="en-US" dirty="0"/>
               <a:t> for version control and code sharing between group members.</a:t>
             </a:r>
           </a:p>
           <a:p>
             <a:r>
-              <a:rPr lang="en-US" dirty="0" err="1" smtClean="0"/>
+              <a:rPr lang="en-US" dirty="0" err="1"/>
               <a:t>OpenGameArt</a:t>
             </a:r>
             <a:r>
-              <a:rPr lang="en-US" dirty="0" smtClean="0"/>
+              <a:rPr lang="en-US" dirty="0"/>
               <a:t> website for graphics</a:t>
             </a:r>
           </a:p>
           <a:p>
             <a:r>
-              <a:rPr lang="en-US" dirty="0" err="1" smtClean="0"/>
+              <a:rPr lang="en-US" dirty="0" err="1"/>
               <a:t>Gitter</a:t>
             </a:r>
             <a:r>
-              <a:rPr lang="en-US" dirty="0" smtClean="0"/>
+              <a:rPr lang="en-US" dirty="0"/>
               <a:t> for chatting over the internet about </a:t>
             </a:r>
           </a:p>
@@ -6323,10 +6339,9 @@
           <a:lstStyle/>
           <a:p>
             <a:r>
-              <a:rPr lang="en-US" dirty="0" smtClean="0"/>
+              <a:rPr lang="en-US" dirty="0"/>
               <a:t>Evaluation</a:t>
             </a:r>
-            <a:endParaRPr lang="en-US" dirty="0"/>
           </a:p>
         </p:txBody>
       </p:sp>
@@ -6346,22 +6361,21 @@
           <a:lstStyle/>
           <a:p>
             <a:r>
-              <a:rPr lang="en-US" dirty="0" smtClean="0"/>
+              <a:rPr lang="en-US" dirty="0"/>
               <a:t>Test all possible cases of use.</a:t>
             </a:r>
           </a:p>
           <a:p>
             <a:r>
-              <a:rPr lang="en-US" dirty="0" smtClean="0"/>
+              <a:rPr lang="en-US" dirty="0"/>
               <a:t>Use play-testers to give feedback on the gameplay and controls.</a:t>
             </a:r>
           </a:p>
           <a:p>
             <a:r>
-              <a:rPr lang="en-US" dirty="0" smtClean="0"/>
+              <a:rPr lang="en-US" dirty="0"/>
               <a:t>Make sure everything works cross-platform (Linux and Windows).</a:t>
             </a:r>
-            <a:endParaRPr lang="en-US" dirty="0"/>
           </a:p>
         </p:txBody>
       </p:sp>
@@ -6411,10 +6425,9 @@
           <a:lstStyle/>
           <a:p>
             <a:r>
-              <a:rPr lang="en-US" dirty="0" smtClean="0"/>
+              <a:rPr lang="en-US" dirty="0"/>
               <a:t>Timeline</a:t>
             </a:r>
-            <a:endParaRPr lang="en-US" dirty="0"/>
           </a:p>
         </p:txBody>
       </p:sp>
@@ -6444,8 +6457,20 @@
                 <a:tableStyleId>{5C22544A-7EE6-4342-B048-85BDC9FD1C3A}</a:tableStyleId>
               </a:tblPr>
               <a:tblGrid>
-                <a:gridCol w="3189611"/>
-                <a:gridCol w="5406702"/>
+                <a:gridCol w="3189611">
+                  <a:extLst>
+                    <a:ext uri="{9D8B030D-6E8A-4147-A177-3AD203B41FA5}">
+                      <a16:colId xmlns:a16="http://schemas.microsoft.com/office/drawing/2014/main" val="20000"/>
+                    </a:ext>
+                  </a:extLst>
+                </a:gridCol>
+                <a:gridCol w="5406702">
+                  <a:extLst>
+                    <a:ext uri="{9D8B030D-6E8A-4147-A177-3AD203B41FA5}">
+                      <a16:colId xmlns:a16="http://schemas.microsoft.com/office/drawing/2014/main" val="20001"/>
+                    </a:ext>
+                  </a:extLst>
+                </a:gridCol>
               </a:tblGrid>
               <a:tr h="370840">
                 <a:tc>
@@ -6454,11 +6479,11 @@
                     <a:lstStyle/>
                     <a:p>
                       <a:r>
-                        <a:rPr lang="en-US" dirty="0" smtClean="0"/>
+                        <a:rPr lang="en-US" dirty="0"/>
                         <a:t>Week (Starting</a:t>
                       </a:r>
                       <a:r>
-                        <a:rPr lang="en-US" baseline="0" dirty="0" smtClean="0"/>
+                        <a:rPr lang="en-US" baseline="0" dirty="0"/>
                         <a:t> 1/29)</a:t>
                       </a:r>
                       <a:endParaRPr lang="en-US" dirty="0"/>
@@ -6472,14 +6497,18 @@
                     <a:lstStyle/>
                     <a:p>
                       <a:r>
-                        <a:rPr lang="en-US" dirty="0" smtClean="0"/>
+                        <a:rPr lang="en-US" dirty="0"/>
                         <a:t>Topics</a:t>
                       </a:r>
-                      <a:endParaRPr lang="en-US" dirty="0"/>
                     </a:p>
                   </a:txBody>
                   <a:tcPr marL="74751" marR="74751"/>
                 </a:tc>
+                <a:extLst>
+                  <a:ext uri="{0D108BD9-81ED-4DB2-BD59-A6C34878D82A}">
+                    <a16:rowId xmlns:a16="http://schemas.microsoft.com/office/drawing/2014/main" val="10000"/>
+                  </a:ext>
+                </a:extLst>
               </a:tr>
               <a:tr h="370840">
                 <a:tc>
@@ -6488,10 +6517,9 @@
                     <a:lstStyle/>
                     <a:p>
                       <a:r>
-                        <a:rPr lang="en-US" dirty="0" smtClean="0"/>
+                        <a:rPr lang="en-US" dirty="0"/>
                         <a:t>Week 1</a:t>
                       </a:r>
-                      <a:endParaRPr lang="en-US" dirty="0"/>
                     </a:p>
                   </a:txBody>
                   <a:tcPr marL="74751" marR="74751"/>
@@ -6502,27 +6530,27 @@
                     <a:lstStyle/>
                     <a:p>
                       <a:r>
-                        <a:rPr lang="en-US" dirty="0" smtClean="0"/>
+                        <a:rPr lang="en-US" dirty="0"/>
                         <a:t>Set up </a:t>
                       </a:r>
                       <a:r>
-                        <a:rPr lang="en-US" dirty="0" err="1" smtClean="0"/>
+                        <a:rPr lang="en-US" dirty="0" err="1"/>
                         <a:t>Github</a:t>
                       </a:r>
                       <a:r>
-                        <a:rPr lang="en-US" dirty="0" smtClean="0"/>
+                        <a:rPr lang="en-US" dirty="0"/>
                         <a:t>, dependencies, a basic window,</a:t>
                       </a:r>
                       <a:r>
-                        <a:rPr lang="en-US" baseline="0" dirty="0" smtClean="0"/>
+                        <a:rPr lang="en-US" baseline="0" dirty="0"/>
                         <a:t> </a:t>
                       </a:r>
                       <a:r>
-                        <a:rPr lang="en-US" dirty="0" smtClean="0"/>
+                        <a:rPr lang="en-US" dirty="0"/>
                         <a:t>and basic</a:t>
                       </a:r>
                       <a:r>
-                        <a:rPr lang="en-US" baseline="0" dirty="0" smtClean="0"/>
+                        <a:rPr lang="en-US" baseline="0" dirty="0"/>
                         <a:t> event handling. Download all open domain images/sprites needed.</a:t>
                       </a:r>
                       <a:endParaRPr lang="en-US" dirty="0"/>
@@ -6530,6 +6558,11 @@
                   </a:txBody>
                   <a:tcPr marL="74751" marR="74751"/>
                 </a:tc>
+                <a:extLst>
+                  <a:ext uri="{0D108BD9-81ED-4DB2-BD59-A6C34878D82A}">
+                    <a16:rowId xmlns:a16="http://schemas.microsoft.com/office/drawing/2014/main" val="10001"/>
+                  </a:ext>
+                </a:extLst>
               </a:tr>
               <a:tr h="370840">
                 <a:tc>
@@ -6538,10 +6571,9 @@
                     <a:lstStyle/>
                     <a:p>
                       <a:r>
-                        <a:rPr lang="en-US" dirty="0" smtClean="0"/>
+                        <a:rPr lang="en-US" dirty="0"/>
                         <a:t>Week 2 &amp; 3</a:t>
                       </a:r>
-                      <a:endParaRPr lang="en-US" dirty="0"/>
                     </a:p>
                   </a:txBody>
                   <a:tcPr marL="74751" marR="74751"/>
@@ -6552,11 +6584,11 @@
                     <a:lstStyle/>
                     <a:p>
                       <a:r>
-                        <a:rPr lang="en-US" dirty="0" smtClean="0"/>
+                        <a:rPr lang="en-US" dirty="0"/>
                         <a:t>Moveable</a:t>
                       </a:r>
                       <a:r>
-                        <a:rPr lang="en-US" baseline="0" dirty="0" smtClean="0"/>
+                        <a:rPr lang="en-US" baseline="0" dirty="0"/>
                         <a:t> character and window’s view of the “world”. Game’s story planned and created.</a:t>
                       </a:r>
                       <a:endParaRPr lang="en-US" dirty="0"/>
@@ -6564,6 +6596,11 @@
                   </a:txBody>
                   <a:tcPr marL="74751" marR="74751"/>
                 </a:tc>
+                <a:extLst>
+                  <a:ext uri="{0D108BD9-81ED-4DB2-BD59-A6C34878D82A}">
+                    <a16:rowId xmlns:a16="http://schemas.microsoft.com/office/drawing/2014/main" val="10002"/>
+                  </a:ext>
+                </a:extLst>
               </a:tr>
               <a:tr h="370840">
                 <a:tc>
@@ -6572,10 +6609,9 @@
                     <a:lstStyle/>
                     <a:p>
                       <a:r>
-                        <a:rPr lang="en-US" dirty="0" smtClean="0"/>
+                        <a:rPr lang="en-US" dirty="0"/>
                         <a:t>Week 4 &amp; 5</a:t>
                       </a:r>
-                      <a:endParaRPr lang="en-US" dirty="0"/>
                     </a:p>
                   </a:txBody>
                   <a:tcPr marL="74751" marR="74751"/>
@@ -6586,11 +6622,11 @@
                     <a:lstStyle/>
                     <a:p>
                       <a:r>
-                        <a:rPr lang="en-US" dirty="0" smtClean="0"/>
+                        <a:rPr lang="en-US" dirty="0"/>
                         <a:t>Character</a:t>
                       </a:r>
                       <a:r>
-                        <a:rPr lang="en-US" baseline="0" dirty="0" smtClean="0"/>
+                        <a:rPr lang="en-US" baseline="0" dirty="0"/>
                         <a:t> attack, inventory, and items. </a:t>
                       </a:r>
                       <a:endParaRPr lang="en-US" dirty="0"/>
@@ -6598,6 +6634,11 @@
                   </a:txBody>
                   <a:tcPr marL="74751" marR="74751"/>
                 </a:tc>
+                <a:extLst>
+                  <a:ext uri="{0D108BD9-81ED-4DB2-BD59-A6C34878D82A}">
+                    <a16:rowId xmlns:a16="http://schemas.microsoft.com/office/drawing/2014/main" val="10003"/>
+                  </a:ext>
+                </a:extLst>
               </a:tr>
               <a:tr h="370840">
                 <a:tc>
@@ -6606,10 +6647,9 @@
                     <a:lstStyle/>
                     <a:p>
                       <a:r>
-                        <a:rPr lang="en-US" dirty="0" smtClean="0"/>
+                        <a:rPr lang="en-US" dirty="0"/>
                         <a:t>Week 6 &amp; 7</a:t>
                       </a:r>
-                      <a:endParaRPr lang="en-US" dirty="0"/>
                     </a:p>
                   </a:txBody>
                   <a:tcPr marL="74751" marR="74751"/>
@@ -6620,11 +6660,11 @@
                     <a:lstStyle/>
                     <a:p>
                       <a:r>
-                        <a:rPr lang="en-US" dirty="0" smtClean="0"/>
+                        <a:rPr lang="en-US" dirty="0"/>
                         <a:t>Implement structures,</a:t>
                       </a:r>
                       <a:r>
-                        <a:rPr lang="en-US" baseline="0" dirty="0" smtClean="0"/>
+                        <a:rPr lang="en-US" baseline="0" dirty="0"/>
                         <a:t> and start Enemy AI.</a:t>
                       </a:r>
                       <a:endParaRPr lang="en-US" dirty="0"/>
@@ -6632,6 +6672,11 @@
                   </a:txBody>
                   <a:tcPr marL="74751" marR="74751"/>
                 </a:tc>
+                <a:extLst>
+                  <a:ext uri="{0D108BD9-81ED-4DB2-BD59-A6C34878D82A}">
+                    <a16:rowId xmlns:a16="http://schemas.microsoft.com/office/drawing/2014/main" val="10004"/>
+                  </a:ext>
+                </a:extLst>
               </a:tr>
               <a:tr h="370840">
                 <a:tc>
@@ -6640,10 +6685,9 @@
                     <a:lstStyle/>
                     <a:p>
                       <a:r>
-                        <a:rPr lang="en-US" dirty="0" smtClean="0"/>
+                        <a:rPr lang="en-US" dirty="0"/>
                         <a:t>Week 8 &amp; 9</a:t>
                       </a:r>
-                      <a:endParaRPr lang="en-US" dirty="0"/>
                     </a:p>
                   </a:txBody>
                   <a:tcPr marL="74751" marR="74751"/>
@@ -6671,18 +6715,23 @@
                         <a:defRPr/>
                       </a:pPr>
                       <a:r>
-                        <a:rPr lang="en-US" dirty="0" smtClean="0"/>
+                        <a:rPr lang="en-US" dirty="0"/>
                         <a:t>Friendly</a:t>
                       </a:r>
                       <a:r>
-                        <a:rPr lang="en-US" baseline="0" dirty="0" smtClean="0"/>
+                        <a:rPr lang="en-US" baseline="0" dirty="0"/>
                         <a:t> NPC AI and implementing story/structures. </a:t>
                       </a:r>
-                      <a:endParaRPr lang="en-US" dirty="0" smtClean="0"/>
+                      <a:endParaRPr lang="en-US" dirty="0"/>
                     </a:p>
                   </a:txBody>
                   <a:tcPr marL="74751" marR="74751"/>
                 </a:tc>
+                <a:extLst>
+                  <a:ext uri="{0D108BD9-81ED-4DB2-BD59-A6C34878D82A}">
+                    <a16:rowId xmlns:a16="http://schemas.microsoft.com/office/drawing/2014/main" val="10005"/>
+                  </a:ext>
+                </a:extLst>
               </a:tr>
               <a:tr h="370840">
                 <a:tc>
@@ -6691,10 +6740,9 @@
                     <a:lstStyle/>
                     <a:p>
                       <a:r>
-                        <a:rPr lang="en-US" dirty="0" smtClean="0"/>
+                        <a:rPr lang="en-US" dirty="0"/>
                         <a:t>Week 10 &amp; 11</a:t>
                       </a:r>
-                      <a:endParaRPr lang="en-US" dirty="0"/>
                     </a:p>
                   </a:txBody>
                   <a:tcPr marL="74751" marR="74751"/>
@@ -6705,11 +6753,11 @@
                     <a:lstStyle/>
                     <a:p>
                       <a:r>
-                        <a:rPr lang="en-US" dirty="0" smtClean="0"/>
+                        <a:rPr lang="en-US" dirty="0"/>
                         <a:t>Find</a:t>
                       </a:r>
                       <a:r>
-                        <a:rPr lang="en-US" baseline="0" dirty="0" smtClean="0"/>
+                        <a:rPr lang="en-US" baseline="0" dirty="0"/>
                         <a:t> methods to improve efficiency and reliability of the program.</a:t>
                       </a:r>
                       <a:endParaRPr lang="en-US" dirty="0"/>
@@ -6717,6 +6765,11 @@
                   </a:txBody>
                   <a:tcPr marL="74751" marR="74751"/>
                 </a:tc>
+                <a:extLst>
+                  <a:ext uri="{0D108BD9-81ED-4DB2-BD59-A6C34878D82A}">
+                    <a16:rowId xmlns:a16="http://schemas.microsoft.com/office/drawing/2014/main" val="10006"/>
+                  </a:ext>
+                </a:extLst>
               </a:tr>
               <a:tr h="370840">
                 <a:tc>
@@ -6725,7 +6778,7 @@
                     <a:lstStyle/>
                     <a:p>
                       <a:r>
-                        <a:rPr lang="en-US" dirty="0" smtClean="0"/>
+                        <a:rPr lang="en-US" dirty="0"/>
                         <a:t>Week 12 &amp; 13</a:t>
                       </a:r>
                     </a:p>
@@ -6755,18 +6808,23 @@
                         <a:defRPr/>
                       </a:pPr>
                       <a:r>
-                        <a:rPr lang="en-US" dirty="0" smtClean="0"/>
+                        <a:rPr lang="en-US" dirty="0"/>
                         <a:t>Play-tester</a:t>
                       </a:r>
                       <a:r>
-                        <a:rPr lang="en-US" baseline="0" dirty="0" smtClean="0"/>
+                        <a:rPr lang="en-US" baseline="0" dirty="0"/>
                         <a:t> feedback and implement changes. </a:t>
                       </a:r>
-                      <a:endParaRPr lang="en-US" dirty="0" smtClean="0"/>
+                      <a:endParaRPr lang="en-US" dirty="0"/>
                     </a:p>
                   </a:txBody>
                   <a:tcPr marL="74751" marR="74751"/>
                 </a:tc>
+                <a:extLst>
+                  <a:ext uri="{0D108BD9-81ED-4DB2-BD59-A6C34878D82A}">
+                    <a16:rowId xmlns:a16="http://schemas.microsoft.com/office/drawing/2014/main" val="10007"/>
+                  </a:ext>
+                </a:extLst>
               </a:tr>
               <a:tr h="370840">
                 <a:tc>
@@ -6775,7 +6833,7 @@
                     <a:lstStyle/>
                     <a:p>
                       <a:r>
-                        <a:rPr lang="en-US" dirty="0" smtClean="0"/>
+                        <a:rPr lang="en-US" dirty="0"/>
                         <a:t>Week 14+</a:t>
                       </a:r>
                     </a:p>
@@ -6805,18 +6863,23 @@
                         <a:defRPr/>
                       </a:pPr>
                       <a:r>
-                        <a:rPr lang="en-US" dirty="0" smtClean="0"/>
+                        <a:rPr lang="en-US" dirty="0"/>
                         <a:t>Extra time for improvements or a</a:t>
                       </a:r>
                       <a:r>
-                        <a:rPr lang="en-US" baseline="0" dirty="0" smtClean="0"/>
+                        <a:rPr lang="en-US" baseline="0" dirty="0"/>
                         <a:t> buffer for missed “deadlines”.</a:t>
                       </a:r>
-                      <a:endParaRPr lang="en-US" dirty="0" smtClean="0"/>
+                      <a:endParaRPr lang="en-US" dirty="0"/>
                     </a:p>
                   </a:txBody>
                   <a:tcPr marL="74751" marR="74751"/>
                 </a:tc>
+                <a:extLst>
+                  <a:ext uri="{0D108BD9-81ED-4DB2-BD59-A6C34878D82A}">
+                    <a16:rowId xmlns:a16="http://schemas.microsoft.com/office/drawing/2014/main" val="10008"/>
+                  </a:ext>
+                </a:extLst>
               </a:tr>
             </a:tbl>
           </a:graphicData>

</xml_diff>

<commit_message>
Added name to powerpoint (#8)
</commit_message>
<xml_diff>
--- a/powerpoint/Bubble Warrior Adventures.pptx
+++ b/powerpoint/Bubble Warrior Adventures.pptx
@@ -110,6 +110,11 @@
       </a:defRPr>
     </a:lvl9pPr>
   </p:defaultTextStyle>
+  <p:extLst>
+    <p:ext uri="{EFAFB233-063F-42B5-8137-9DF3F51BA10A}">
+      <p15:sldGuideLst xmlns:p15="http://schemas.microsoft.com/office/powerpoint/2012/main"/>
+    </p:ext>
+  </p:extLst>
 </p:presentation>
 </file>
 
@@ -691,7 +696,7 @@
           </a:lstStyle>
           <a:p>
             <a:r>
-              <a:rPr lang="en-US" smtClean="0"/>
+              <a:rPr lang="en-US"/>
               <a:t>Click to edit Master title style</a:t>
             </a:r>
             <a:endParaRPr lang="en-US" dirty="0"/>
@@ -811,7 +816,7 @@
           </a:lstStyle>
           <a:p>
             <a:r>
-              <a:rPr lang="en-US" smtClean="0"/>
+              <a:rPr lang="en-US"/>
               <a:t>Click to edit Master subtitle style</a:t>
             </a:r>
             <a:endParaRPr lang="en-US" dirty="0"/>
@@ -835,7 +840,7 @@
           <a:p>
             <a:fld id="{8F07F569-3A41-400A-AFFF-DAD58A2A63FB}" type="datetimeFigureOut">
               <a:rPr lang="en-US" smtClean="0"/>
-              <a:t>1/30/2017</a:t>
+              <a:t>1/31/2017</a:t>
             </a:fld>
             <a:endParaRPr lang="en-US"/>
           </a:p>
@@ -940,7 +945,7 @@
           </a:lstStyle>
           <a:p>
             <a:r>
-              <a:rPr lang="en-US" smtClean="0"/>
+              <a:rPr lang="en-US"/>
               <a:t>Click to edit Master title style</a:t>
             </a:r>
             <a:endParaRPr lang="en-US" dirty="0"/>
@@ -1063,7 +1068,7 @@
           <a:p>
             <a:pPr lvl="0"/>
             <a:r>
-              <a:rPr lang="en-US" smtClean="0"/>
+              <a:rPr lang="en-US"/>
               <a:t>Click to edit Master text styles</a:t>
             </a:r>
           </a:p>
@@ -1086,7 +1091,7 @@
           <a:p>
             <a:fld id="{8F07F569-3A41-400A-AFFF-DAD58A2A63FB}" type="datetimeFigureOut">
               <a:rPr lang="en-US" smtClean="0"/>
-              <a:t>1/30/2017</a:t>
+              <a:t>1/31/2017</a:t>
             </a:fld>
             <a:endParaRPr lang="en-US"/>
           </a:p>
@@ -1191,7 +1196,7 @@
           </a:lstStyle>
           <a:p>
             <a:r>
-              <a:rPr lang="en-US" smtClean="0"/>
+              <a:rPr lang="en-US"/>
               <a:t>Click to edit Master title style</a:t>
             </a:r>
             <a:endParaRPr lang="en-US" dirty="0"/>
@@ -1255,7 +1260,7 @@
           <a:p>
             <a:pPr lvl="0"/>
             <a:r>
-              <a:rPr lang="en-US" smtClean="0"/>
+              <a:rPr lang="en-US"/>
               <a:t>Click to edit Master text styles</a:t>
             </a:r>
           </a:p>
@@ -1377,7 +1382,7 @@
           <a:p>
             <a:pPr lvl="0"/>
             <a:r>
-              <a:rPr lang="en-US" smtClean="0"/>
+              <a:rPr lang="en-US"/>
               <a:t>Click to edit Master text styles</a:t>
             </a:r>
           </a:p>
@@ -1400,7 +1405,7 @@
           <a:p>
             <a:fld id="{8F07F569-3A41-400A-AFFF-DAD58A2A63FB}" type="datetimeFigureOut">
               <a:rPr lang="en-US" smtClean="0"/>
-              <a:t>1/30/2017</a:t>
+              <a:t>1/31/2017</a:t>
             </a:fld>
             <a:endParaRPr lang="en-US"/>
           </a:p>
@@ -1595,7 +1600,7 @@
           </a:lstStyle>
           <a:p>
             <a:r>
-              <a:rPr lang="en-US" smtClean="0"/>
+              <a:rPr lang="en-US"/>
               <a:t>Click to edit Master title style</a:t>
             </a:r>
             <a:endParaRPr lang="en-US" dirty="0"/>
@@ -1718,7 +1723,7 @@
           <a:p>
             <a:pPr lvl="0"/>
             <a:r>
-              <a:rPr lang="en-US" smtClean="0"/>
+              <a:rPr lang="en-US"/>
               <a:t>Click to edit Master text styles</a:t>
             </a:r>
           </a:p>
@@ -1741,7 +1746,7 @@
           <a:p>
             <a:fld id="{8F07F569-3A41-400A-AFFF-DAD58A2A63FB}" type="datetimeFigureOut">
               <a:rPr lang="en-US" smtClean="0"/>
-              <a:t>1/30/2017</a:t>
+              <a:t>1/31/2017</a:t>
             </a:fld>
             <a:endParaRPr lang="en-US"/>
           </a:p>
@@ -1846,7 +1851,7 @@
           </a:lstStyle>
           <a:p>
             <a:r>
-              <a:rPr lang="en-US" smtClean="0"/>
+              <a:rPr lang="en-US"/>
               <a:t>Click to edit Master title style</a:t>
             </a:r>
             <a:endParaRPr lang="en-US" dirty="0"/>
@@ -1910,7 +1915,7 @@
           <a:p>
             <a:pPr lvl="0"/>
             <a:r>
-              <a:rPr lang="en-US" smtClean="0"/>
+              <a:rPr lang="en-US"/>
               <a:t>Click to edit Master text styles</a:t>
             </a:r>
           </a:p>
@@ -2032,7 +2037,7 @@
           <a:p>
             <a:pPr lvl="0"/>
             <a:r>
-              <a:rPr lang="en-US" smtClean="0"/>
+              <a:rPr lang="en-US"/>
               <a:t>Click to edit Master text styles</a:t>
             </a:r>
           </a:p>
@@ -2055,7 +2060,7 @@
           <a:p>
             <a:fld id="{8F07F569-3A41-400A-AFFF-DAD58A2A63FB}" type="datetimeFigureOut">
               <a:rPr lang="en-US" smtClean="0"/>
-              <a:t>1/30/2017</a:t>
+              <a:t>1/31/2017</a:t>
             </a:fld>
             <a:endParaRPr lang="en-US"/>
           </a:p>
@@ -2242,7 +2247,7 @@
           </a:lstStyle>
           <a:p>
             <a:r>
-              <a:rPr lang="en-US" smtClean="0"/>
+              <a:rPr lang="en-US"/>
               <a:t>Click to edit Master title style</a:t>
             </a:r>
             <a:endParaRPr lang="en-US" dirty="0"/>
@@ -2303,7 +2308,7 @@
           <a:p>
             <a:pPr lvl="0"/>
             <a:r>
-              <a:rPr lang="en-US" smtClean="0"/>
+              <a:rPr lang="en-US"/>
               <a:t>Click to edit Master text styles</a:t>
             </a:r>
           </a:p>
@@ -2425,7 +2430,7 @@
           <a:p>
             <a:pPr lvl="0"/>
             <a:r>
-              <a:rPr lang="en-US" smtClean="0"/>
+              <a:rPr lang="en-US"/>
               <a:t>Click to edit Master text styles</a:t>
             </a:r>
           </a:p>
@@ -2448,7 +2453,7 @@
           <a:p>
             <a:fld id="{8F07F569-3A41-400A-AFFF-DAD58A2A63FB}" type="datetimeFigureOut">
               <a:rPr lang="en-US" smtClean="0"/>
-              <a:t>1/30/2017</a:t>
+              <a:t>1/31/2017</a:t>
             </a:fld>
             <a:endParaRPr lang="en-US"/>
           </a:p>
@@ -2542,7 +2547,7 @@
           <a:lstStyle/>
           <a:p>
             <a:r>
-              <a:rPr lang="en-US" smtClean="0"/>
+              <a:rPr lang="en-US"/>
               <a:t>Click to edit Master title style</a:t>
             </a:r>
             <a:endParaRPr lang="en-US" dirty="0"/>
@@ -2566,35 +2571,35 @@
           <a:p>
             <a:pPr lvl="0"/>
             <a:r>
-              <a:rPr lang="en-US" smtClean="0"/>
+              <a:rPr lang="en-US"/>
               <a:t>Click to edit Master text styles</a:t>
             </a:r>
           </a:p>
           <a:p>
             <a:pPr lvl="1"/>
             <a:r>
-              <a:rPr lang="en-US" smtClean="0"/>
+              <a:rPr lang="en-US"/>
               <a:t>Second level</a:t>
             </a:r>
           </a:p>
           <a:p>
             <a:pPr lvl="2"/>
             <a:r>
-              <a:rPr lang="en-US" smtClean="0"/>
+              <a:rPr lang="en-US"/>
               <a:t>Third level</a:t>
             </a:r>
           </a:p>
           <a:p>
             <a:pPr lvl="3"/>
             <a:r>
-              <a:rPr lang="en-US" smtClean="0"/>
+              <a:rPr lang="en-US"/>
               <a:t>Fourth level</a:t>
             </a:r>
           </a:p>
           <a:p>
             <a:pPr lvl="4"/>
             <a:r>
-              <a:rPr lang="en-US" smtClean="0"/>
+              <a:rPr lang="en-US"/>
               <a:t>Fifth level</a:t>
             </a:r>
             <a:endParaRPr lang="en-US" dirty="0"/>
@@ -2618,7 +2623,7 @@
           <a:p>
             <a:fld id="{8F07F569-3A41-400A-AFFF-DAD58A2A63FB}" type="datetimeFigureOut">
               <a:rPr lang="en-US" smtClean="0"/>
-              <a:t>1/30/2017</a:t>
+              <a:t>1/31/2017</a:t>
             </a:fld>
             <a:endParaRPr lang="en-US"/>
           </a:p>
@@ -2717,7 +2722,7 @@
           <a:lstStyle/>
           <a:p>
             <a:r>
-              <a:rPr lang="en-US" smtClean="0"/>
+              <a:rPr lang="en-US"/>
               <a:t>Click to edit Master title style</a:t>
             </a:r>
             <a:endParaRPr lang="en-US" dirty="0"/>
@@ -2746,35 +2751,35 @@
           <a:p>
             <a:pPr lvl="0"/>
             <a:r>
-              <a:rPr lang="en-US" smtClean="0"/>
+              <a:rPr lang="en-US"/>
               <a:t>Click to edit Master text styles</a:t>
             </a:r>
           </a:p>
           <a:p>
             <a:pPr lvl="1"/>
             <a:r>
-              <a:rPr lang="en-US" smtClean="0"/>
+              <a:rPr lang="en-US"/>
               <a:t>Second level</a:t>
             </a:r>
           </a:p>
           <a:p>
             <a:pPr lvl="2"/>
             <a:r>
-              <a:rPr lang="en-US" smtClean="0"/>
+              <a:rPr lang="en-US"/>
               <a:t>Third level</a:t>
             </a:r>
           </a:p>
           <a:p>
             <a:pPr lvl="3"/>
             <a:r>
-              <a:rPr lang="en-US" smtClean="0"/>
+              <a:rPr lang="en-US"/>
               <a:t>Fourth level</a:t>
             </a:r>
           </a:p>
           <a:p>
             <a:pPr lvl="4"/>
             <a:r>
-              <a:rPr lang="en-US" smtClean="0"/>
+              <a:rPr lang="en-US"/>
               <a:t>Fifth level</a:t>
             </a:r>
             <a:endParaRPr lang="en-US" dirty="0"/>
@@ -2798,7 +2803,7 @@
           <a:p>
             <a:fld id="{8F07F569-3A41-400A-AFFF-DAD58A2A63FB}" type="datetimeFigureOut">
               <a:rPr lang="en-US" smtClean="0"/>
-              <a:t>1/30/2017</a:t>
+              <a:t>1/31/2017</a:t>
             </a:fld>
             <a:endParaRPr lang="en-US"/>
           </a:p>
@@ -2898,7 +2903,7 @@
           </a:lstStyle>
           <a:p>
             <a:r>
-              <a:rPr lang="en-US" smtClean="0"/>
+              <a:rPr lang="en-US"/>
               <a:t>Click to edit Master title style</a:t>
             </a:r>
             <a:endParaRPr lang="en-US" dirty="0"/>
@@ -2922,35 +2927,35 @@
           <a:p>
             <a:pPr lvl="0"/>
             <a:r>
-              <a:rPr lang="en-US" smtClean="0"/>
+              <a:rPr lang="en-US"/>
               <a:t>Click to edit Master text styles</a:t>
             </a:r>
           </a:p>
           <a:p>
             <a:pPr lvl="1"/>
             <a:r>
-              <a:rPr lang="en-US" smtClean="0"/>
+              <a:rPr lang="en-US"/>
               <a:t>Second level</a:t>
             </a:r>
           </a:p>
           <a:p>
             <a:pPr lvl="2"/>
             <a:r>
-              <a:rPr lang="en-US" smtClean="0"/>
+              <a:rPr lang="en-US"/>
               <a:t>Third level</a:t>
             </a:r>
           </a:p>
           <a:p>
             <a:pPr lvl="3"/>
             <a:r>
-              <a:rPr lang="en-US" smtClean="0"/>
+              <a:rPr lang="en-US"/>
               <a:t>Fourth level</a:t>
             </a:r>
           </a:p>
           <a:p>
             <a:pPr lvl="4"/>
             <a:r>
-              <a:rPr lang="en-US" smtClean="0"/>
+              <a:rPr lang="en-US"/>
               <a:t>Fifth level</a:t>
             </a:r>
             <a:endParaRPr lang="en-US" dirty="0"/>
@@ -2974,7 +2979,7 @@
           <a:p>
             <a:fld id="{8F07F569-3A41-400A-AFFF-DAD58A2A63FB}" type="datetimeFigureOut">
               <a:rPr lang="en-US" smtClean="0"/>
-              <a:t>1/30/2017</a:t>
+              <a:t>1/31/2017</a:t>
             </a:fld>
             <a:endParaRPr lang="en-US"/>
           </a:p>
@@ -3077,7 +3082,7 @@
           </a:lstStyle>
           <a:p>
             <a:r>
-              <a:rPr lang="en-US" smtClean="0"/>
+              <a:rPr lang="en-US"/>
               <a:t>Click to edit Master title style</a:t>
             </a:r>
             <a:endParaRPr lang="en-US" dirty="0"/>
@@ -3198,7 +3203,7 @@
           <a:p>
             <a:pPr lvl="0"/>
             <a:r>
-              <a:rPr lang="en-US" smtClean="0"/>
+              <a:rPr lang="en-US"/>
               <a:t>Click to edit Master text styles</a:t>
             </a:r>
           </a:p>
@@ -3221,7 +3226,7 @@
           <a:p>
             <a:fld id="{8F07F569-3A41-400A-AFFF-DAD58A2A63FB}" type="datetimeFigureOut">
               <a:rPr lang="en-US" smtClean="0"/>
-              <a:t>1/30/2017</a:t>
+              <a:t>1/31/2017</a:t>
             </a:fld>
             <a:endParaRPr lang="en-US"/>
           </a:p>
@@ -3315,7 +3320,7 @@
           <a:lstStyle/>
           <a:p>
             <a:r>
-              <a:rPr lang="en-US" smtClean="0"/>
+              <a:rPr lang="en-US"/>
               <a:t>Click to edit Master title style</a:t>
             </a:r>
             <a:endParaRPr lang="en-US" dirty="0"/>
@@ -3344,35 +3349,35 @@
           <a:p>
             <a:pPr lvl="0"/>
             <a:r>
-              <a:rPr lang="en-US" smtClean="0"/>
+              <a:rPr lang="en-US"/>
               <a:t>Click to edit Master text styles</a:t>
             </a:r>
           </a:p>
           <a:p>
             <a:pPr lvl="1"/>
             <a:r>
-              <a:rPr lang="en-US" smtClean="0"/>
+              <a:rPr lang="en-US"/>
               <a:t>Second level</a:t>
             </a:r>
           </a:p>
           <a:p>
             <a:pPr lvl="2"/>
             <a:r>
-              <a:rPr lang="en-US" smtClean="0"/>
+              <a:rPr lang="en-US"/>
               <a:t>Third level</a:t>
             </a:r>
           </a:p>
           <a:p>
             <a:pPr lvl="3"/>
             <a:r>
-              <a:rPr lang="en-US" smtClean="0"/>
+              <a:rPr lang="en-US"/>
               <a:t>Fourth level</a:t>
             </a:r>
           </a:p>
           <a:p>
             <a:pPr lvl="4"/>
             <a:r>
-              <a:rPr lang="en-US" smtClean="0"/>
+              <a:rPr lang="en-US"/>
               <a:t>Fifth level</a:t>
             </a:r>
             <a:endParaRPr lang="en-US" dirty="0"/>
@@ -3401,35 +3406,35 @@
           <a:p>
             <a:pPr lvl="0"/>
             <a:r>
-              <a:rPr lang="en-US" smtClean="0"/>
+              <a:rPr lang="en-US"/>
               <a:t>Click to edit Master text styles</a:t>
             </a:r>
           </a:p>
           <a:p>
             <a:pPr lvl="1"/>
             <a:r>
-              <a:rPr lang="en-US" smtClean="0"/>
+              <a:rPr lang="en-US"/>
               <a:t>Second level</a:t>
             </a:r>
           </a:p>
           <a:p>
             <a:pPr lvl="2"/>
             <a:r>
-              <a:rPr lang="en-US" smtClean="0"/>
+              <a:rPr lang="en-US"/>
               <a:t>Third level</a:t>
             </a:r>
           </a:p>
           <a:p>
             <a:pPr lvl="3"/>
             <a:r>
-              <a:rPr lang="en-US" smtClean="0"/>
+              <a:rPr lang="en-US"/>
               <a:t>Fourth level</a:t>
             </a:r>
           </a:p>
           <a:p>
             <a:pPr lvl="4"/>
             <a:r>
-              <a:rPr lang="en-US" smtClean="0"/>
+              <a:rPr lang="en-US"/>
               <a:t>Fifth level</a:t>
             </a:r>
             <a:endParaRPr lang="en-US" dirty="0"/>
@@ -3453,7 +3458,7 @@
           <a:p>
             <a:fld id="{8F07F569-3A41-400A-AFFF-DAD58A2A63FB}" type="datetimeFigureOut">
               <a:rPr lang="en-US" smtClean="0"/>
-              <a:t>1/30/2017</a:t>
+              <a:t>1/31/2017</a:t>
             </a:fld>
             <a:endParaRPr lang="en-US"/>
           </a:p>
@@ -3551,7 +3556,7 @@
           </a:lstStyle>
           <a:p>
             <a:r>
-              <a:rPr lang="en-US" smtClean="0"/>
+              <a:rPr lang="en-US"/>
               <a:t>Click to edit Master title style</a:t>
             </a:r>
             <a:endParaRPr lang="en-US" dirty="0"/>
@@ -3619,7 +3624,7 @@
           <a:p>
             <a:pPr lvl="0"/>
             <a:r>
-              <a:rPr lang="en-US" smtClean="0"/>
+              <a:rPr lang="en-US"/>
               <a:t>Click to edit Master text styles</a:t>
             </a:r>
           </a:p>
@@ -3649,35 +3654,35 @@
           <a:p>
             <a:pPr lvl="0"/>
             <a:r>
-              <a:rPr lang="en-US" smtClean="0"/>
+              <a:rPr lang="en-US"/>
               <a:t>Click to edit Master text styles</a:t>
             </a:r>
           </a:p>
           <a:p>
             <a:pPr lvl="1"/>
             <a:r>
-              <a:rPr lang="en-US" smtClean="0"/>
+              <a:rPr lang="en-US"/>
               <a:t>Second level</a:t>
             </a:r>
           </a:p>
           <a:p>
             <a:pPr lvl="2"/>
             <a:r>
-              <a:rPr lang="en-US" smtClean="0"/>
+              <a:rPr lang="en-US"/>
               <a:t>Third level</a:t>
             </a:r>
           </a:p>
           <a:p>
             <a:pPr lvl="3"/>
             <a:r>
-              <a:rPr lang="en-US" smtClean="0"/>
+              <a:rPr lang="en-US"/>
               <a:t>Fourth level</a:t>
             </a:r>
           </a:p>
           <a:p>
             <a:pPr lvl="4"/>
             <a:r>
-              <a:rPr lang="en-US" smtClean="0"/>
+              <a:rPr lang="en-US"/>
               <a:t>Fifth level</a:t>
             </a:r>
             <a:endParaRPr lang="en-US" dirty="0"/>
@@ -3745,7 +3750,7 @@
           <a:p>
             <a:pPr lvl="0"/>
             <a:r>
-              <a:rPr lang="en-US" smtClean="0"/>
+              <a:rPr lang="en-US"/>
               <a:t>Click to edit Master text styles</a:t>
             </a:r>
           </a:p>
@@ -3775,35 +3780,35 @@
           <a:p>
             <a:pPr lvl="0"/>
             <a:r>
-              <a:rPr lang="en-US" smtClean="0"/>
+              <a:rPr lang="en-US"/>
               <a:t>Click to edit Master text styles</a:t>
             </a:r>
           </a:p>
           <a:p>
             <a:pPr lvl="1"/>
             <a:r>
-              <a:rPr lang="en-US" smtClean="0"/>
+              <a:rPr lang="en-US"/>
               <a:t>Second level</a:t>
             </a:r>
           </a:p>
           <a:p>
             <a:pPr lvl="2"/>
             <a:r>
-              <a:rPr lang="en-US" smtClean="0"/>
+              <a:rPr lang="en-US"/>
               <a:t>Third level</a:t>
             </a:r>
           </a:p>
           <a:p>
             <a:pPr lvl="3"/>
             <a:r>
-              <a:rPr lang="en-US" smtClean="0"/>
+              <a:rPr lang="en-US"/>
               <a:t>Fourth level</a:t>
             </a:r>
           </a:p>
           <a:p>
             <a:pPr lvl="4"/>
             <a:r>
-              <a:rPr lang="en-US" smtClean="0"/>
+              <a:rPr lang="en-US"/>
               <a:t>Fifth level</a:t>
             </a:r>
             <a:endParaRPr lang="en-US" dirty="0"/>
@@ -3827,7 +3832,7 @@
           <a:p>
             <a:fld id="{8F07F569-3A41-400A-AFFF-DAD58A2A63FB}" type="datetimeFigureOut">
               <a:rPr lang="en-US" smtClean="0"/>
-              <a:t>1/30/2017</a:t>
+              <a:t>1/31/2017</a:t>
             </a:fld>
             <a:endParaRPr lang="en-US"/>
           </a:p>
@@ -3926,7 +3931,7 @@
           <a:lstStyle/>
           <a:p>
             <a:r>
-              <a:rPr lang="en-US" smtClean="0"/>
+              <a:rPr lang="en-US"/>
               <a:t>Click to edit Master title style</a:t>
             </a:r>
             <a:endParaRPr lang="en-US" dirty="0"/>
@@ -3950,7 +3955,7 @@
           <a:p>
             <a:fld id="{8F07F569-3A41-400A-AFFF-DAD58A2A63FB}" type="datetimeFigureOut">
               <a:rPr lang="en-US" smtClean="0"/>
-              <a:t>1/30/2017</a:t>
+              <a:t>1/31/2017</a:t>
             </a:fld>
             <a:endParaRPr lang="en-US"/>
           </a:p>
@@ -4045,7 +4050,7 @@
           <a:p>
             <a:fld id="{8F07F569-3A41-400A-AFFF-DAD58A2A63FB}" type="datetimeFigureOut">
               <a:rPr lang="en-US" smtClean="0"/>
-              <a:t>1/30/2017</a:t>
+              <a:t>1/31/2017</a:t>
             </a:fld>
             <a:endParaRPr lang="en-US"/>
           </a:p>
@@ -4150,7 +4155,7 @@
           </a:lstStyle>
           <a:p>
             <a:r>
-              <a:rPr lang="en-US" smtClean="0"/>
+              <a:rPr lang="en-US"/>
               <a:t>Click to edit Master title style</a:t>
             </a:r>
             <a:endParaRPr lang="en-US" dirty="0"/>
@@ -4181,35 +4186,35 @@
           <a:p>
             <a:pPr lvl="0"/>
             <a:r>
-              <a:rPr lang="en-US" smtClean="0"/>
+              <a:rPr lang="en-US"/>
               <a:t>Click to edit Master text styles</a:t>
             </a:r>
           </a:p>
           <a:p>
             <a:pPr lvl="1"/>
             <a:r>
-              <a:rPr lang="en-US" smtClean="0"/>
+              <a:rPr lang="en-US"/>
               <a:t>Second level</a:t>
             </a:r>
           </a:p>
           <a:p>
             <a:pPr lvl="2"/>
             <a:r>
-              <a:rPr lang="en-US" smtClean="0"/>
+              <a:rPr lang="en-US"/>
               <a:t>Third level</a:t>
             </a:r>
           </a:p>
           <a:p>
             <a:pPr lvl="3"/>
             <a:r>
-              <a:rPr lang="en-US" smtClean="0"/>
+              <a:rPr lang="en-US"/>
               <a:t>Fourth level</a:t>
             </a:r>
           </a:p>
           <a:p>
             <a:pPr lvl="4"/>
             <a:r>
-              <a:rPr lang="en-US" smtClean="0"/>
+              <a:rPr lang="en-US"/>
               <a:t>Fifth level</a:t>
             </a:r>
             <a:endParaRPr lang="en-US" dirty="0"/>
@@ -4277,7 +4282,7 @@
           <a:p>
             <a:pPr lvl="0"/>
             <a:r>
-              <a:rPr lang="en-US" smtClean="0"/>
+              <a:rPr lang="en-US"/>
               <a:t>Click to edit Master text styles</a:t>
             </a:r>
           </a:p>
@@ -4300,7 +4305,7 @@
           <a:p>
             <a:fld id="{8F07F569-3A41-400A-AFFF-DAD58A2A63FB}" type="datetimeFigureOut">
               <a:rPr lang="en-US" smtClean="0"/>
-              <a:t>1/30/2017</a:t>
+              <a:t>1/31/2017</a:t>
             </a:fld>
             <a:endParaRPr lang="en-US"/>
           </a:p>
@@ -4405,7 +4410,7 @@
           </a:lstStyle>
           <a:p>
             <a:r>
-              <a:rPr lang="en-US" smtClean="0"/>
+              <a:rPr lang="en-US"/>
               <a:t>Click to edit Master title style</a:t>
             </a:r>
             <a:endParaRPr lang="en-US" dirty="0"/>
@@ -4472,7 +4477,7 @@
           </a:lstStyle>
           <a:p>
             <a:r>
-              <a:rPr lang="en-US" smtClean="0"/>
+              <a:rPr lang="en-US"/>
               <a:t>Click icon to add picture</a:t>
             </a:r>
             <a:endParaRPr lang="en-US" dirty="0"/>
@@ -4540,7 +4545,7 @@
           <a:p>
             <a:pPr lvl="0"/>
             <a:r>
-              <a:rPr lang="en-US" smtClean="0"/>
+              <a:rPr lang="en-US"/>
               <a:t>Click to edit Master text styles</a:t>
             </a:r>
           </a:p>
@@ -4563,7 +4568,7 @@
           <a:p>
             <a:fld id="{8F07F569-3A41-400A-AFFF-DAD58A2A63FB}" type="datetimeFigureOut">
               <a:rPr lang="en-US" smtClean="0"/>
-              <a:t>1/30/2017</a:t>
+              <a:t>1/31/2017</a:t>
             </a:fld>
             <a:endParaRPr lang="en-US"/>
           </a:p>
@@ -5202,7 +5207,7 @@
           <a:lstStyle/>
           <a:p>
             <a:r>
-              <a:rPr lang="en-US" smtClean="0"/>
+              <a:rPr lang="en-US"/>
               <a:t>Click to edit Master title style</a:t>
             </a:r>
             <a:endParaRPr lang="en-US" dirty="0"/>
@@ -5236,35 +5241,35 @@
           <a:p>
             <a:pPr lvl="0"/>
             <a:r>
-              <a:rPr lang="en-US" smtClean="0"/>
+              <a:rPr lang="en-US"/>
               <a:t>Click to edit Master text styles</a:t>
             </a:r>
           </a:p>
           <a:p>
             <a:pPr lvl="1"/>
             <a:r>
-              <a:rPr lang="en-US" smtClean="0"/>
+              <a:rPr lang="en-US"/>
               <a:t>Second level</a:t>
             </a:r>
           </a:p>
           <a:p>
             <a:pPr lvl="2"/>
             <a:r>
-              <a:rPr lang="en-US" smtClean="0"/>
+              <a:rPr lang="en-US"/>
               <a:t>Third level</a:t>
             </a:r>
           </a:p>
           <a:p>
             <a:pPr lvl="3"/>
             <a:r>
-              <a:rPr lang="en-US" smtClean="0"/>
+              <a:rPr lang="en-US"/>
               <a:t>Fourth level</a:t>
             </a:r>
           </a:p>
           <a:p>
             <a:pPr lvl="4"/>
             <a:r>
-              <a:rPr lang="en-US" smtClean="0"/>
+              <a:rPr lang="en-US"/>
               <a:t>Fifth level</a:t>
             </a:r>
             <a:endParaRPr lang="en-US" dirty="0"/>
@@ -5306,7 +5311,7 @@
           <a:p>
             <a:fld id="{8F07F569-3A41-400A-AFFF-DAD58A2A63FB}" type="datetimeFigureOut">
               <a:rPr lang="en-US" smtClean="0"/>
-              <a:t>1/30/2017</a:t>
+              <a:t>1/31/2017</a:t>
             </a:fld>
             <a:endParaRPr lang="en-US"/>
           </a:p>
@@ -5846,10 +5851,9 @@
           <a:lstStyle/>
           <a:p>
             <a:r>
-              <a:rPr lang="en-US" dirty="0" smtClean="0"/>
+              <a:rPr lang="en-US" dirty="0"/>
               <a:t>Bubble Warrior Adventures</a:t>
             </a:r>
-            <a:endParaRPr lang="en-US" dirty="0"/>
           </a:p>
         </p:txBody>
       </p:sp>
@@ -5870,20 +5874,37 @@
           </a:xfrm>
         </p:spPr>
         <p:txBody>
-          <a:bodyPr/>
-          <a:lstStyle/>
-          <a:p>
-            <a:r>
-              <a:rPr lang="en-US" dirty="0" smtClean="0"/>
+          <a:bodyPr>
+            <a:normAutofit lnSpcReduction="10000"/>
+          </a:bodyPr>
+          <a:lstStyle/>
+          <a:p>
+            <a:r>
+              <a:rPr lang="en-US" dirty="0"/>
               <a:t>Kyle Jolicoeur (Kyle_Jolicoeur@student.uml.edu)</a:t>
             </a:r>
           </a:p>
           <a:p>
             <a:r>
-              <a:rPr lang="en-US" dirty="0" smtClean="0"/>
-              <a:t>Hansel De La Cruz (Hansel_DeLaCruz@student.uml.edu)</a:t>
-            </a:r>
-            <a:endParaRPr lang="en-US" dirty="0"/>
+              <a:rPr lang="en-US" dirty="0"/>
+              <a:t>Hansel De La Cruz (</a:t>
+            </a:r>
+            <a:r>
+              <a:rPr lang="en-US" dirty="0">
+                <a:hlinkClick r:id="rId2"/>
+              </a:rPr>
+              <a:t>Hansel_DeLaCruz@student.uml.edu</a:t>
+            </a:r>
+            <a:r>
+              <a:rPr lang="en-US" dirty="0"/>
+              <a:t>)</a:t>
+            </a:r>
+          </a:p>
+          <a:p>
+            <a:r>
+              <a:rPr lang="en-US" dirty="0"/>
+              <a:t>Jennifer Green (Jennifer_Green@student.uml.edu)</a:t>
+            </a:r>
           </a:p>
         </p:txBody>
       </p:sp>
@@ -5933,10 +5954,9 @@
           <a:lstStyle/>
           <a:p>
             <a:r>
-              <a:rPr lang="en-US" dirty="0" smtClean="0"/>
+              <a:rPr lang="en-US" dirty="0"/>
               <a:t>Introduction</a:t>
             </a:r>
-            <a:endParaRPr lang="en-US" dirty="0"/>
           </a:p>
         </p:txBody>
       </p:sp>
@@ -5956,25 +5976,25 @@
           <a:lstStyle/>
           <a:p>
             <a:r>
-              <a:rPr lang="en-US" dirty="0" smtClean="0"/>
+              <a:rPr lang="en-US" dirty="0"/>
               <a:t>Our goal is to create an RPG styled game with basic AI scripts for entertainment purposes.</a:t>
             </a:r>
           </a:p>
           <a:p>
             <a:r>
-              <a:rPr lang="en-US" dirty="0" smtClean="0"/>
+              <a:rPr lang="en-US" dirty="0"/>
               <a:t>Top-down 2D graphics.</a:t>
             </a:r>
           </a:p>
           <a:p>
             <a:r>
-              <a:rPr lang="en-US" dirty="0" smtClean="0"/>
+              <a:rPr lang="en-US" dirty="0"/>
               <a:t>Desktop application.</a:t>
             </a:r>
           </a:p>
           <a:p>
             <a:r>
-              <a:rPr lang="en-US" dirty="0" smtClean="0"/>
+              <a:rPr lang="en-US" dirty="0"/>
               <a:t>Will be compiled for both Linux and Windows (separately).</a:t>
             </a:r>
           </a:p>
@@ -6026,10 +6046,9 @@
           <a:lstStyle/>
           <a:p>
             <a:r>
-              <a:rPr lang="en-US" dirty="0" smtClean="0"/>
+              <a:rPr lang="en-US" dirty="0"/>
               <a:t>Motivation</a:t>
             </a:r>
-            <a:endParaRPr lang="en-US" dirty="0"/>
           </a:p>
         </p:txBody>
       </p:sp>
@@ -6049,22 +6068,21 @@
           <a:lstStyle/>
           <a:p>
             <a:r>
-              <a:rPr lang="en-US" dirty="0" smtClean="0"/>
+              <a:rPr lang="en-US" dirty="0"/>
               <a:t>We both have an interest with video games, and are curious to see what goes into creating a game from scratch.</a:t>
             </a:r>
           </a:p>
           <a:p>
             <a:r>
-              <a:rPr lang="en-US" dirty="0" smtClean="0"/>
+              <a:rPr lang="en-US" dirty="0"/>
               <a:t>It also requires us to learn to program efficiently so we do not use an excess of computer resources in order to run the game.</a:t>
             </a:r>
           </a:p>
           <a:p>
             <a:r>
-              <a:rPr lang="en-US" dirty="0" smtClean="0"/>
+              <a:rPr lang="en-US" dirty="0"/>
               <a:t>A fun project to show friends and family.</a:t>
             </a:r>
-            <a:endParaRPr lang="en-US" dirty="0"/>
           </a:p>
         </p:txBody>
       </p:sp>
@@ -6114,10 +6132,9 @@
           <a:lstStyle/>
           <a:p>
             <a:r>
-              <a:rPr lang="en-US" dirty="0" smtClean="0"/>
+              <a:rPr lang="en-US" dirty="0"/>
               <a:t>Related Works</a:t>
             </a:r>
-            <a:endParaRPr lang="en-US" dirty="0"/>
           </a:p>
         </p:txBody>
       </p:sp>
@@ -6137,23 +6154,23 @@
           <a:lstStyle/>
           <a:p>
             <a:r>
-              <a:rPr lang="en-US" dirty="0" smtClean="0"/>
+              <a:rPr lang="en-US" dirty="0"/>
               <a:t>There are plenty of examples that can be used as a style reference.</a:t>
             </a:r>
           </a:p>
           <a:p>
             <a:r>
-              <a:rPr lang="en-US" dirty="0" smtClean="0"/>
+              <a:rPr lang="en-US" dirty="0"/>
               <a:t>Early 1990’s styled video games.</a:t>
             </a:r>
           </a:p>
           <a:p>
             <a:r>
-              <a:rPr lang="en-US" dirty="0" err="1" smtClean="0"/>
+              <a:rPr lang="en-US" dirty="0" err="1"/>
               <a:t>Pokemon</a:t>
             </a:r>
             <a:r>
-              <a:rPr lang="en-US" dirty="0" smtClean="0"/>
+              <a:rPr lang="en-US" dirty="0"/>
               <a:t>, The Legend of Zelda, Etc.</a:t>
             </a:r>
           </a:p>
@@ -6208,10 +6225,9 @@
           <a:lstStyle/>
           <a:p>
             <a:r>
-              <a:rPr lang="en-US" dirty="0" smtClean="0"/>
+              <a:rPr lang="en-US" dirty="0"/>
               <a:t>Proposed Approach</a:t>
             </a:r>
-            <a:endParaRPr lang="en-US" dirty="0"/>
           </a:p>
         </p:txBody>
       </p:sp>
@@ -6231,47 +6247,47 @@
           <a:lstStyle/>
           <a:p>
             <a:r>
-              <a:rPr lang="en-US" dirty="0" smtClean="0"/>
+              <a:rPr lang="en-US" dirty="0"/>
               <a:t>C++ based program using the SFML libraries.</a:t>
             </a:r>
           </a:p>
           <a:p>
             <a:r>
-              <a:rPr lang="en-US" dirty="0" err="1" smtClean="0"/>
+              <a:rPr lang="en-US" dirty="0" err="1"/>
               <a:t>Lua</a:t>
             </a:r>
             <a:r>
-              <a:rPr lang="en-US" dirty="0" smtClean="0"/>
+              <a:rPr lang="en-US" dirty="0"/>
               <a:t> for storing configurations, AI scripts, and data.</a:t>
             </a:r>
           </a:p>
           <a:p>
             <a:r>
-              <a:rPr lang="en-US" dirty="0" err="1" smtClean="0"/>
+              <a:rPr lang="en-US" dirty="0" err="1"/>
               <a:t>Github</a:t>
             </a:r>
             <a:r>
-              <a:rPr lang="en-US" dirty="0" smtClean="0"/>
+              <a:rPr lang="en-US" dirty="0"/>
               <a:t> for version control and code sharing between group members.</a:t>
             </a:r>
           </a:p>
           <a:p>
             <a:r>
-              <a:rPr lang="en-US" dirty="0" err="1" smtClean="0"/>
+              <a:rPr lang="en-US" dirty="0" err="1"/>
               <a:t>OpenGameArt</a:t>
             </a:r>
             <a:r>
-              <a:rPr lang="en-US" dirty="0" smtClean="0"/>
+              <a:rPr lang="en-US" dirty="0"/>
               <a:t> website for graphics</a:t>
             </a:r>
           </a:p>
           <a:p>
             <a:r>
-              <a:rPr lang="en-US" dirty="0" err="1" smtClean="0"/>
+              <a:rPr lang="en-US" dirty="0" err="1"/>
               <a:t>Gitter</a:t>
             </a:r>
             <a:r>
-              <a:rPr lang="en-US" dirty="0" smtClean="0"/>
+              <a:rPr lang="en-US" dirty="0"/>
               <a:t> for chatting over the internet about </a:t>
             </a:r>
           </a:p>
@@ -6323,10 +6339,9 @@
           <a:lstStyle/>
           <a:p>
             <a:r>
-              <a:rPr lang="en-US" dirty="0" smtClean="0"/>
+              <a:rPr lang="en-US" dirty="0"/>
               <a:t>Evaluation</a:t>
             </a:r>
-            <a:endParaRPr lang="en-US" dirty="0"/>
           </a:p>
         </p:txBody>
       </p:sp>
@@ -6346,22 +6361,21 @@
           <a:lstStyle/>
           <a:p>
             <a:r>
-              <a:rPr lang="en-US" dirty="0" smtClean="0"/>
+              <a:rPr lang="en-US" dirty="0"/>
               <a:t>Test all possible cases of use.</a:t>
             </a:r>
           </a:p>
           <a:p>
             <a:r>
-              <a:rPr lang="en-US" dirty="0" smtClean="0"/>
+              <a:rPr lang="en-US" dirty="0"/>
               <a:t>Use play-testers to give feedback on the gameplay and controls.</a:t>
             </a:r>
           </a:p>
           <a:p>
             <a:r>
-              <a:rPr lang="en-US" dirty="0" smtClean="0"/>
+              <a:rPr lang="en-US" dirty="0"/>
               <a:t>Make sure everything works cross-platform (Linux and Windows).</a:t>
             </a:r>
-            <a:endParaRPr lang="en-US" dirty="0"/>
           </a:p>
         </p:txBody>
       </p:sp>
@@ -6411,10 +6425,9 @@
           <a:lstStyle/>
           <a:p>
             <a:r>
-              <a:rPr lang="en-US" dirty="0" smtClean="0"/>
+              <a:rPr lang="en-US" dirty="0"/>
               <a:t>Timeline</a:t>
             </a:r>
-            <a:endParaRPr lang="en-US" dirty="0"/>
           </a:p>
         </p:txBody>
       </p:sp>
@@ -6444,8 +6457,20 @@
                 <a:tableStyleId>{5C22544A-7EE6-4342-B048-85BDC9FD1C3A}</a:tableStyleId>
               </a:tblPr>
               <a:tblGrid>
-                <a:gridCol w="3189611"/>
-                <a:gridCol w="5406702"/>
+                <a:gridCol w="3189611">
+                  <a:extLst>
+                    <a:ext uri="{9D8B030D-6E8A-4147-A177-3AD203B41FA5}">
+                      <a16:colId xmlns:a16="http://schemas.microsoft.com/office/drawing/2014/main" val="20000"/>
+                    </a:ext>
+                  </a:extLst>
+                </a:gridCol>
+                <a:gridCol w="5406702">
+                  <a:extLst>
+                    <a:ext uri="{9D8B030D-6E8A-4147-A177-3AD203B41FA5}">
+                      <a16:colId xmlns:a16="http://schemas.microsoft.com/office/drawing/2014/main" val="20001"/>
+                    </a:ext>
+                  </a:extLst>
+                </a:gridCol>
               </a:tblGrid>
               <a:tr h="370840">
                 <a:tc>
@@ -6454,11 +6479,11 @@
                     <a:lstStyle/>
                     <a:p>
                       <a:r>
-                        <a:rPr lang="en-US" dirty="0" smtClean="0"/>
+                        <a:rPr lang="en-US" dirty="0"/>
                         <a:t>Week (Starting</a:t>
                       </a:r>
                       <a:r>
-                        <a:rPr lang="en-US" baseline="0" dirty="0" smtClean="0"/>
+                        <a:rPr lang="en-US" baseline="0" dirty="0"/>
                         <a:t> 1/29)</a:t>
                       </a:r>
                       <a:endParaRPr lang="en-US" dirty="0"/>
@@ -6472,14 +6497,18 @@
                     <a:lstStyle/>
                     <a:p>
                       <a:r>
-                        <a:rPr lang="en-US" dirty="0" smtClean="0"/>
+                        <a:rPr lang="en-US" dirty="0"/>
                         <a:t>Topics</a:t>
                       </a:r>
-                      <a:endParaRPr lang="en-US" dirty="0"/>
                     </a:p>
                   </a:txBody>
                   <a:tcPr marL="74751" marR="74751"/>
                 </a:tc>
+                <a:extLst>
+                  <a:ext uri="{0D108BD9-81ED-4DB2-BD59-A6C34878D82A}">
+                    <a16:rowId xmlns:a16="http://schemas.microsoft.com/office/drawing/2014/main" val="10000"/>
+                  </a:ext>
+                </a:extLst>
               </a:tr>
               <a:tr h="370840">
                 <a:tc>
@@ -6488,10 +6517,9 @@
                     <a:lstStyle/>
                     <a:p>
                       <a:r>
-                        <a:rPr lang="en-US" dirty="0" smtClean="0"/>
+                        <a:rPr lang="en-US" dirty="0"/>
                         <a:t>Week 1</a:t>
                       </a:r>
-                      <a:endParaRPr lang="en-US" dirty="0"/>
                     </a:p>
                   </a:txBody>
                   <a:tcPr marL="74751" marR="74751"/>
@@ -6502,27 +6530,27 @@
                     <a:lstStyle/>
                     <a:p>
                       <a:r>
-                        <a:rPr lang="en-US" dirty="0" smtClean="0"/>
+                        <a:rPr lang="en-US" dirty="0"/>
                         <a:t>Set up </a:t>
                       </a:r>
                       <a:r>
-                        <a:rPr lang="en-US" dirty="0" err="1" smtClean="0"/>
+                        <a:rPr lang="en-US" dirty="0" err="1"/>
                         <a:t>Github</a:t>
                       </a:r>
                       <a:r>
-                        <a:rPr lang="en-US" dirty="0" smtClean="0"/>
+                        <a:rPr lang="en-US" dirty="0"/>
                         <a:t>, dependencies, a basic window,</a:t>
                       </a:r>
                       <a:r>
-                        <a:rPr lang="en-US" baseline="0" dirty="0" smtClean="0"/>
+                        <a:rPr lang="en-US" baseline="0" dirty="0"/>
                         <a:t> </a:t>
                       </a:r>
                       <a:r>
-                        <a:rPr lang="en-US" dirty="0" smtClean="0"/>
+                        <a:rPr lang="en-US" dirty="0"/>
                         <a:t>and basic</a:t>
                       </a:r>
                       <a:r>
-                        <a:rPr lang="en-US" baseline="0" dirty="0" smtClean="0"/>
+                        <a:rPr lang="en-US" baseline="0" dirty="0"/>
                         <a:t> event handling. Download all open domain images/sprites needed.</a:t>
                       </a:r>
                       <a:endParaRPr lang="en-US" dirty="0"/>
@@ -6530,6 +6558,11 @@
                   </a:txBody>
                   <a:tcPr marL="74751" marR="74751"/>
                 </a:tc>
+                <a:extLst>
+                  <a:ext uri="{0D108BD9-81ED-4DB2-BD59-A6C34878D82A}">
+                    <a16:rowId xmlns:a16="http://schemas.microsoft.com/office/drawing/2014/main" val="10001"/>
+                  </a:ext>
+                </a:extLst>
               </a:tr>
               <a:tr h="370840">
                 <a:tc>
@@ -6538,10 +6571,9 @@
                     <a:lstStyle/>
                     <a:p>
                       <a:r>
-                        <a:rPr lang="en-US" dirty="0" smtClean="0"/>
+                        <a:rPr lang="en-US" dirty="0"/>
                         <a:t>Week 2 &amp; 3</a:t>
                       </a:r>
-                      <a:endParaRPr lang="en-US" dirty="0"/>
                     </a:p>
                   </a:txBody>
                   <a:tcPr marL="74751" marR="74751"/>
@@ -6552,11 +6584,11 @@
                     <a:lstStyle/>
                     <a:p>
                       <a:r>
-                        <a:rPr lang="en-US" dirty="0" smtClean="0"/>
+                        <a:rPr lang="en-US" dirty="0"/>
                         <a:t>Moveable</a:t>
                       </a:r>
                       <a:r>
-                        <a:rPr lang="en-US" baseline="0" dirty="0" smtClean="0"/>
+                        <a:rPr lang="en-US" baseline="0" dirty="0"/>
                         <a:t> character and window’s view of the “world”. Game’s story planned and created.</a:t>
                       </a:r>
                       <a:endParaRPr lang="en-US" dirty="0"/>
@@ -6564,6 +6596,11 @@
                   </a:txBody>
                   <a:tcPr marL="74751" marR="74751"/>
                 </a:tc>
+                <a:extLst>
+                  <a:ext uri="{0D108BD9-81ED-4DB2-BD59-A6C34878D82A}">
+                    <a16:rowId xmlns:a16="http://schemas.microsoft.com/office/drawing/2014/main" val="10002"/>
+                  </a:ext>
+                </a:extLst>
               </a:tr>
               <a:tr h="370840">
                 <a:tc>
@@ -6572,10 +6609,9 @@
                     <a:lstStyle/>
                     <a:p>
                       <a:r>
-                        <a:rPr lang="en-US" dirty="0" smtClean="0"/>
+                        <a:rPr lang="en-US" dirty="0"/>
                         <a:t>Week 4 &amp; 5</a:t>
                       </a:r>
-                      <a:endParaRPr lang="en-US" dirty="0"/>
                     </a:p>
                   </a:txBody>
                   <a:tcPr marL="74751" marR="74751"/>
@@ -6586,11 +6622,11 @@
                     <a:lstStyle/>
                     <a:p>
                       <a:r>
-                        <a:rPr lang="en-US" dirty="0" smtClean="0"/>
+                        <a:rPr lang="en-US" dirty="0"/>
                         <a:t>Character</a:t>
                       </a:r>
                       <a:r>
-                        <a:rPr lang="en-US" baseline="0" dirty="0" smtClean="0"/>
+                        <a:rPr lang="en-US" baseline="0" dirty="0"/>
                         <a:t> attack, inventory, and items. </a:t>
                       </a:r>
                       <a:endParaRPr lang="en-US" dirty="0"/>
@@ -6598,6 +6634,11 @@
                   </a:txBody>
                   <a:tcPr marL="74751" marR="74751"/>
                 </a:tc>
+                <a:extLst>
+                  <a:ext uri="{0D108BD9-81ED-4DB2-BD59-A6C34878D82A}">
+                    <a16:rowId xmlns:a16="http://schemas.microsoft.com/office/drawing/2014/main" val="10003"/>
+                  </a:ext>
+                </a:extLst>
               </a:tr>
               <a:tr h="370840">
                 <a:tc>
@@ -6606,10 +6647,9 @@
                     <a:lstStyle/>
                     <a:p>
                       <a:r>
-                        <a:rPr lang="en-US" dirty="0" smtClean="0"/>
+                        <a:rPr lang="en-US" dirty="0"/>
                         <a:t>Week 6 &amp; 7</a:t>
                       </a:r>
-                      <a:endParaRPr lang="en-US" dirty="0"/>
                     </a:p>
                   </a:txBody>
                   <a:tcPr marL="74751" marR="74751"/>
@@ -6620,11 +6660,11 @@
                     <a:lstStyle/>
                     <a:p>
                       <a:r>
-                        <a:rPr lang="en-US" dirty="0" smtClean="0"/>
+                        <a:rPr lang="en-US" dirty="0"/>
                         <a:t>Implement structures,</a:t>
                       </a:r>
                       <a:r>
-                        <a:rPr lang="en-US" baseline="0" dirty="0" smtClean="0"/>
+                        <a:rPr lang="en-US" baseline="0" dirty="0"/>
                         <a:t> and start Enemy AI.</a:t>
                       </a:r>
                       <a:endParaRPr lang="en-US" dirty="0"/>
@@ -6632,6 +6672,11 @@
                   </a:txBody>
                   <a:tcPr marL="74751" marR="74751"/>
                 </a:tc>
+                <a:extLst>
+                  <a:ext uri="{0D108BD9-81ED-4DB2-BD59-A6C34878D82A}">
+                    <a16:rowId xmlns:a16="http://schemas.microsoft.com/office/drawing/2014/main" val="10004"/>
+                  </a:ext>
+                </a:extLst>
               </a:tr>
               <a:tr h="370840">
                 <a:tc>
@@ -6640,10 +6685,9 @@
                     <a:lstStyle/>
                     <a:p>
                       <a:r>
-                        <a:rPr lang="en-US" dirty="0" smtClean="0"/>
+                        <a:rPr lang="en-US" dirty="0"/>
                         <a:t>Week 8 &amp; 9</a:t>
                       </a:r>
-                      <a:endParaRPr lang="en-US" dirty="0"/>
                     </a:p>
                   </a:txBody>
                   <a:tcPr marL="74751" marR="74751"/>
@@ -6671,18 +6715,23 @@
                         <a:defRPr/>
                       </a:pPr>
                       <a:r>
-                        <a:rPr lang="en-US" dirty="0" smtClean="0"/>
+                        <a:rPr lang="en-US" dirty="0"/>
                         <a:t>Friendly</a:t>
                       </a:r>
                       <a:r>
-                        <a:rPr lang="en-US" baseline="0" dirty="0" smtClean="0"/>
+                        <a:rPr lang="en-US" baseline="0" dirty="0"/>
                         <a:t> NPC AI and implementing story/structures. </a:t>
                       </a:r>
-                      <a:endParaRPr lang="en-US" dirty="0" smtClean="0"/>
+                      <a:endParaRPr lang="en-US" dirty="0"/>
                     </a:p>
                   </a:txBody>
                   <a:tcPr marL="74751" marR="74751"/>
                 </a:tc>
+                <a:extLst>
+                  <a:ext uri="{0D108BD9-81ED-4DB2-BD59-A6C34878D82A}">
+                    <a16:rowId xmlns:a16="http://schemas.microsoft.com/office/drawing/2014/main" val="10005"/>
+                  </a:ext>
+                </a:extLst>
               </a:tr>
               <a:tr h="370840">
                 <a:tc>
@@ -6691,10 +6740,9 @@
                     <a:lstStyle/>
                     <a:p>
                       <a:r>
-                        <a:rPr lang="en-US" dirty="0" smtClean="0"/>
+                        <a:rPr lang="en-US" dirty="0"/>
                         <a:t>Week 10 &amp; 11</a:t>
                       </a:r>
-                      <a:endParaRPr lang="en-US" dirty="0"/>
                     </a:p>
                   </a:txBody>
                   <a:tcPr marL="74751" marR="74751"/>
@@ -6705,11 +6753,11 @@
                     <a:lstStyle/>
                     <a:p>
                       <a:r>
-                        <a:rPr lang="en-US" dirty="0" smtClean="0"/>
+                        <a:rPr lang="en-US" dirty="0"/>
                         <a:t>Find</a:t>
                       </a:r>
                       <a:r>
-                        <a:rPr lang="en-US" baseline="0" dirty="0" smtClean="0"/>
+                        <a:rPr lang="en-US" baseline="0" dirty="0"/>
                         <a:t> methods to improve efficiency and reliability of the program.</a:t>
                       </a:r>
                       <a:endParaRPr lang="en-US" dirty="0"/>
@@ -6717,6 +6765,11 @@
                   </a:txBody>
                   <a:tcPr marL="74751" marR="74751"/>
                 </a:tc>
+                <a:extLst>
+                  <a:ext uri="{0D108BD9-81ED-4DB2-BD59-A6C34878D82A}">
+                    <a16:rowId xmlns:a16="http://schemas.microsoft.com/office/drawing/2014/main" val="10006"/>
+                  </a:ext>
+                </a:extLst>
               </a:tr>
               <a:tr h="370840">
                 <a:tc>
@@ -6725,7 +6778,7 @@
                     <a:lstStyle/>
                     <a:p>
                       <a:r>
-                        <a:rPr lang="en-US" dirty="0" smtClean="0"/>
+                        <a:rPr lang="en-US" dirty="0"/>
                         <a:t>Week 12 &amp; 13</a:t>
                       </a:r>
                     </a:p>
@@ -6755,18 +6808,23 @@
                         <a:defRPr/>
                       </a:pPr>
                       <a:r>
-                        <a:rPr lang="en-US" dirty="0" smtClean="0"/>
+                        <a:rPr lang="en-US" dirty="0"/>
                         <a:t>Play-tester</a:t>
                       </a:r>
                       <a:r>
-                        <a:rPr lang="en-US" baseline="0" dirty="0" smtClean="0"/>
+                        <a:rPr lang="en-US" baseline="0" dirty="0"/>
                         <a:t> feedback and implement changes. </a:t>
                       </a:r>
-                      <a:endParaRPr lang="en-US" dirty="0" smtClean="0"/>
+                      <a:endParaRPr lang="en-US" dirty="0"/>
                     </a:p>
                   </a:txBody>
                   <a:tcPr marL="74751" marR="74751"/>
                 </a:tc>
+                <a:extLst>
+                  <a:ext uri="{0D108BD9-81ED-4DB2-BD59-A6C34878D82A}">
+                    <a16:rowId xmlns:a16="http://schemas.microsoft.com/office/drawing/2014/main" val="10007"/>
+                  </a:ext>
+                </a:extLst>
               </a:tr>
               <a:tr h="370840">
                 <a:tc>
@@ -6775,7 +6833,7 @@
                     <a:lstStyle/>
                     <a:p>
                       <a:r>
-                        <a:rPr lang="en-US" dirty="0" smtClean="0"/>
+                        <a:rPr lang="en-US" dirty="0"/>
                         <a:t>Week 14+</a:t>
                       </a:r>
                     </a:p>
@@ -6805,18 +6863,23 @@
                         <a:defRPr/>
                       </a:pPr>
                       <a:r>
-                        <a:rPr lang="en-US" dirty="0" smtClean="0"/>
+                        <a:rPr lang="en-US" dirty="0"/>
                         <a:t>Extra time for improvements or a</a:t>
                       </a:r>
                       <a:r>
-                        <a:rPr lang="en-US" baseline="0" dirty="0" smtClean="0"/>
+                        <a:rPr lang="en-US" baseline="0" dirty="0"/>
                         <a:t> buffer for missed “deadlines”.</a:t>
                       </a:r>
-                      <a:endParaRPr lang="en-US" dirty="0" smtClean="0"/>
+                      <a:endParaRPr lang="en-US" dirty="0"/>
                     </a:p>
                   </a:txBody>
                   <a:tcPr marL="74751" marR="74751"/>
                 </a:tc>
+                <a:extLst>
+                  <a:ext uri="{0D108BD9-81ED-4DB2-BD59-A6C34878D82A}">
+                    <a16:rowId xmlns:a16="http://schemas.microsoft.com/office/drawing/2014/main" val="10008"/>
+                  </a:ext>
+                </a:extLst>
               </a:tr>
             </a:tbl>
           </a:graphicData>

</xml_diff>